<commit_message>
DDP and EE updates
</commit_message>
<xml_diff>
--- a/High School/Design and Drawing for Production/Unit 3 - Introduction to Lettering/Section 1 - What is Lettering/Assets/Unit 3 - Section 1 - What is Lettering.pptx
+++ b/High School/Design and Drawing for Production/Unit 3 - Introduction to Lettering/Section 1 - What is Lettering/Assets/Unit 3 - Section 1 - What is Lettering.pptx
@@ -5,10 +5,10 @@
     <p:sldMasterId id="2147483705" r:id="rId1"/>
   </p:sldMasterIdLst>
   <p:notesMasterIdLst>
-    <p:notesMasterId r:id="rId10"/>
+    <p:notesMasterId r:id="rId15"/>
   </p:notesMasterIdLst>
   <p:handoutMasterIdLst>
-    <p:handoutMasterId r:id="rId11"/>
+    <p:handoutMasterId r:id="rId16"/>
   </p:handoutMasterIdLst>
   <p:sldIdLst>
     <p:sldId id="268" r:id="rId2"/>
@@ -19,6 +19,11 @@
     <p:sldId id="280" r:id="rId7"/>
     <p:sldId id="281" r:id="rId8"/>
     <p:sldId id="282" r:id="rId9"/>
+    <p:sldId id="283" r:id="rId10"/>
+    <p:sldId id="284" r:id="rId11"/>
+    <p:sldId id="285" r:id="rId12"/>
+    <p:sldId id="286" r:id="rId13"/>
+    <p:sldId id="287" r:id="rId14"/>
   </p:sldIdLst>
   <p:sldSz cx="12192000" cy="6858000"/>
   <p:notesSz cx="6858000" cy="9144000"/>
@@ -221,7 +226,7 @@
           <a:p>
             <a:fld id="{6AC4FB8F-ED15-48AB-97BD-17129D4E699D}" type="datetimeFigureOut">
               <a:rPr lang="en-US" smtClean="0"/>
-              <a:t>10/3/2018</a:t>
+              <a:t>10/4/2018</a:t>
             </a:fld>
             <a:endParaRPr lang="en-US" dirty="0"/>
           </a:p>
@@ -386,7 +391,7 @@
           <a:p>
             <a:fld id="{BBC9D437-CD83-4825-AD0D-5E7B341BC79B}" type="datetimeFigureOut">
               <a:rPr lang="en-US" smtClean="0"/>
-              <a:t>10/3/2018</a:t>
+              <a:t>10/4/2018</a:t>
             </a:fld>
             <a:endParaRPr lang="en-US" dirty="0"/>
           </a:p>
@@ -784,7 +789,7 @@
           <a:p>
             <a:fld id="{85AB7CBB-843F-464A-A764-71D6ADC27CFA}" type="datetime1">
               <a:rPr lang="en-US" smtClean="0"/>
-              <a:t>10/3/2018</a:t>
+              <a:t>10/4/2018</a:t>
             </a:fld>
             <a:endParaRPr lang="en-US" dirty="0"/>
           </a:p>
@@ -971,7 +976,7 @@
           <a:p>
             <a:fld id="{CBEFC03D-3A1F-4813-9337-02411FCC3A9A}" type="datetime1">
               <a:rPr lang="en-US" smtClean="0"/>
-              <a:t>10/3/2018</a:t>
+              <a:t>10/4/2018</a:t>
             </a:fld>
             <a:endParaRPr lang="en-US" dirty="0"/>
           </a:p>
@@ -1167,7 +1172,7 @@
           <a:p>
             <a:fld id="{3D638F79-DFA0-4C26-9553-23A017B69AB6}" type="datetime1">
               <a:rPr lang="en-US" smtClean="0"/>
-              <a:t>10/3/2018</a:t>
+              <a:t>10/4/2018</a:t>
             </a:fld>
             <a:endParaRPr lang="en-US" dirty="0"/>
           </a:p>
@@ -1278,7 +1283,7 @@
           <a:p>
             <a:fld id="{AA615CA6-EC4D-4728-8AA6-534BE7E9B67C}" type="datetime1">
               <a:rPr lang="en-US" smtClean="0"/>
-              <a:t>10/3/2018</a:t>
+              <a:t>10/4/2018</a:t>
             </a:fld>
             <a:endParaRPr lang="en-US" dirty="0"/>
           </a:p>
@@ -1463,7 +1468,7 @@
           <a:p>
             <a:fld id="{A70B34E7-E1D9-4FBF-A1A0-4009669A00BF}" type="datetime1">
               <a:rPr lang="en-US" smtClean="0"/>
-              <a:t>10/3/2018</a:t>
+              <a:t>10/4/2018</a:t>
             </a:fld>
             <a:endParaRPr lang="en-US" dirty="0"/>
           </a:p>
@@ -1726,7 +1731,7 @@
           <a:p>
             <a:fld id="{C50FD434-5945-4FAF-A8C0-DAE9905532CE}" type="datetimeFigureOut">
               <a:rPr lang="en-US" smtClean="0"/>
-              <a:t>10/3/2018</a:t>
+              <a:t>10/4/2018</a:t>
             </a:fld>
             <a:endParaRPr lang="en-US"/>
           </a:p>
@@ -1970,7 +1975,7 @@
           <a:p>
             <a:fld id="{7579E8B6-2F47-420B-83EA-EB2285D13EC9}" type="datetime1">
               <a:rPr lang="en-US" smtClean="0"/>
-              <a:t>10/3/2018</a:t>
+              <a:t>10/4/2018</a:t>
             </a:fld>
             <a:endParaRPr lang="en-US" dirty="0"/>
           </a:p>
@@ -2353,7 +2358,7 @@
           <a:p>
             <a:fld id="{2304803D-B10E-4B90-8456-A0E05393E233}" type="datetime1">
               <a:rPr lang="en-US" smtClean="0"/>
-              <a:t>10/3/2018</a:t>
+              <a:t>10/4/2018</a:t>
             </a:fld>
             <a:endParaRPr lang="en-US" dirty="0"/>
           </a:p>
@@ -2487,7 +2492,7 @@
           <a:p>
             <a:fld id="{CCE1E62F-6CCE-4064-96C2-2084AF883904}" type="datetime1">
               <a:rPr lang="en-US" smtClean="0"/>
-              <a:t>10/3/2018</a:t>
+              <a:t>10/4/2018</a:t>
             </a:fld>
             <a:endParaRPr lang="en-US" dirty="0"/>
           </a:p>
@@ -2598,7 +2603,7 @@
           <a:p>
             <a:fld id="{AA615CA6-EC4D-4728-8AA6-534BE7E9B67C}" type="datetime1">
               <a:rPr lang="en-US" smtClean="0"/>
-              <a:t>10/3/2018</a:t>
+              <a:t>10/4/2018</a:t>
             </a:fld>
             <a:endParaRPr lang="en-US" dirty="0"/>
           </a:p>
@@ -2891,7 +2896,7 @@
           <a:p>
             <a:fld id="{A6139942-0A2E-443A-842F-D6DE74360370}" type="datetime1">
               <a:rPr lang="en-US" smtClean="0"/>
-              <a:t>10/3/2018</a:t>
+              <a:t>10/4/2018</a:t>
             </a:fld>
             <a:endParaRPr lang="en-US" dirty="0"/>
           </a:p>
@@ -3164,7 +3169,7 @@
           <a:p>
             <a:fld id="{C50FD434-5945-4FAF-A8C0-DAE9905532CE}" type="datetimeFigureOut">
               <a:rPr lang="en-US" smtClean="0"/>
-              <a:t>10/3/2018</a:t>
+              <a:t>10/4/2018</a:t>
             </a:fld>
             <a:endParaRPr lang="en-US"/>
           </a:p>
@@ -3441,7 +3446,7 @@
           <a:p>
             <a:fld id="{3F138946-C5C1-4A11-BA69-F12F43F8A94B}" type="datetime1">
               <a:rPr lang="en-US" smtClean="0"/>
-              <a:t>10/3/2018</a:t>
+              <a:t>10/4/2018</a:t>
             </a:fld>
             <a:endParaRPr lang="en-US" dirty="0"/>
           </a:p>
@@ -4033,7 +4038,7 @@
 </p:sld>
 </file>
 
-<file path=ppt/slides/slide2.xml><?xml version="1.0" encoding="utf-8"?>
+<file path=ppt/slides/slide10.xml><?xml version="1.0" encoding="utf-8"?>
 <p:sld xmlns:a="http://schemas.openxmlformats.org/drawingml/2006/main" xmlns:r="http://schemas.openxmlformats.org/officeDocument/2006/relationships" xmlns:p="http://schemas.openxmlformats.org/presentationml/2006/main">
   <p:cSld>
     <p:bg>
@@ -4060,10 +4065,10 @@
       </p:grpSpPr>
       <p:sp>
         <p:nvSpPr>
-          <p:cNvPr id="9" name="Rectangle 8">
+          <p:cNvPr id="135" name="Rectangle 134">
             <a:extLst>
               <a:ext uri="{FF2B5EF4-FFF2-40B4-BE49-F238E27FC236}">
-                <a16:creationId xmlns:a16="http://schemas.microsoft.com/office/drawing/2014/main" id="{6F9EB9F2-07E2-4D64-BBD8-BB5B217F1218}"/>
+                <a16:creationId xmlns:a16="http://schemas.microsoft.com/office/drawing/2014/main" id="{AB45A142-4255-493C-8284-5D566C121B10}"/>
               </a:ext>
               <a:ext uri="{C183D7F6-B498-43B3-948B-1728B52AA6E4}">
                 <adec:decorative xmlns:adec="http://schemas.microsoft.com/office/drawing/2017/decorative" val="1"/>
@@ -4083,19 +4088,23 @@
         </p:nvSpPr>
         <p:spPr bwMode="ltGray">
           <a:xfrm>
-            <a:off x="321564" y="320040"/>
-            <a:ext cx="11548872" cy="6217920"/>
+            <a:off x="336884" y="321177"/>
+            <a:ext cx="4332307" cy="6179552"/>
           </a:xfrm>
           <a:prstGeom prst="rect">
             <a:avLst/>
           </a:prstGeom>
           <a:solidFill>
-            <a:schemeClr val="tx1">
-              <a:alpha val="12000"/>
-            </a:schemeClr>
+            <a:srgbClr val="404040">
+              <a:alpha val="89804"/>
+            </a:srgbClr>
           </a:solidFill>
           <a:ln w="127000" cap="sq" cmpd="thinThick">
-            <a:noFill/>
+            <a:solidFill>
+              <a:srgbClr val="595959">
+                <a:alpha val="80000"/>
+              </a:srgbClr>
+            </a:solidFill>
           </a:ln>
         </p:spPr>
         <p:style>
@@ -4125,7 +4134,13 @@
       </p:sp>
       <p:sp>
         <p:nvSpPr>
-          <p:cNvPr id="2" name="Title 1"/>
+          <p:cNvPr id="4" name="Title 3">
+            <a:extLst>
+              <a:ext uri="{FF2B5EF4-FFF2-40B4-BE49-F238E27FC236}">
+                <a16:creationId xmlns:a16="http://schemas.microsoft.com/office/drawing/2014/main" id="{6E72D690-3946-41C4-B01B-C2857A0A1E69}"/>
+              </a:ext>
+            </a:extLst>
+          </p:cNvPr>
           <p:cNvSpPr>
             <a:spLocks noGrp="1"/>
           </p:cNvSpPr>
@@ -4135,36 +4150,40 @@
         </p:nvSpPr>
         <p:spPr>
           <a:xfrm>
-            <a:off x="4380588" y="965199"/>
-            <a:ext cx="6766078" cy="4927601"/>
-          </a:xfrm>
-        </p:spPr>
-        <p:txBody>
-          <a:bodyPr vert="horz" lIns="91440" tIns="45720" rIns="91440" bIns="45720" rtlCol="0" anchor="ctr">
+            <a:off x="674237" y="914400"/>
+            <a:ext cx="3657600" cy="2887579"/>
+          </a:xfrm>
+        </p:spPr>
+        <p:txBody>
+          <a:bodyPr vert="horz" lIns="91440" tIns="45720" rIns="91440" bIns="45720" rtlCol="0" anchor="b">
             <a:normAutofit/>
           </a:bodyPr>
           <a:lstStyle/>
           <a:p>
-            <a:r>
-              <a:rPr lang="en-US" sz="5400" kern="1200">
+            <a:pPr algn="ctr"/>
+            <a:r>
+              <a:rPr lang="en-US" sz="4800" kern="1200">
                 <a:solidFill>
-                  <a:schemeClr val="tx1">
-                    <a:lumMod val="85000"/>
-                    <a:lumOff val="15000"/>
-                  </a:schemeClr>
+                  <a:srgbClr val="FFFFFF"/>
                 </a:solidFill>
                 <a:latin typeface="+mj-lt"/>
                 <a:ea typeface="+mj-ea"/>
                 <a:cs typeface="+mj-cs"/>
               </a:rPr>
-              <a:t>Google classroom code</a:t>
-            </a:r>
-          </a:p>
-        </p:txBody>
-      </p:sp>
-      <p:sp>
-        <p:nvSpPr>
-          <p:cNvPr id="3" name="Content Placeholder 2"/>
+              <a:t>Why technical lettering?</a:t>
+            </a:r>
+          </a:p>
+        </p:txBody>
+      </p:sp>
+      <p:sp>
+        <p:nvSpPr>
+          <p:cNvPr id="5" name="Content Placeholder 4">
+            <a:extLst>
+              <a:ext uri="{FF2B5EF4-FFF2-40B4-BE49-F238E27FC236}">
+                <a16:creationId xmlns:a16="http://schemas.microsoft.com/office/drawing/2014/main" id="{A2540170-1DBD-4347-B779-0831D3F5A786}"/>
+              </a:ext>
+            </a:extLst>
+          </p:cNvPr>
           <p:cNvSpPr>
             <a:spLocks noGrp="1"/>
           </p:cNvSpPr>
@@ -4174,39 +4193,39 @@
         </p:nvSpPr>
         <p:spPr>
           <a:xfrm>
-            <a:off x="1023257" y="965198"/>
-            <a:ext cx="2707937" cy="4927602"/>
-          </a:xfrm>
-        </p:spPr>
-        <p:txBody>
-          <a:bodyPr vert="horz" lIns="91440" tIns="45720" rIns="91440" bIns="45720" rtlCol="0" anchor="ctr">
+            <a:off x="674237" y="4170501"/>
+            <a:ext cx="3657600" cy="1525597"/>
+          </a:xfrm>
+        </p:spPr>
+        <p:txBody>
+          <a:bodyPr vert="horz" lIns="91440" tIns="45720" rIns="91440" bIns="45720" rtlCol="0">
             <a:normAutofit/>
           </a:bodyPr>
           <a:lstStyle/>
           <a:p>
-            <a:pPr marL="0" indent="0" algn="r">
+            <a:pPr marL="0" indent="0" algn="ctr">
               <a:buNone/>
             </a:pPr>
             <a:r>
-              <a:rPr lang="en-US" sz="2000" b="1" kern="1200">
+              <a:rPr lang="en-US" sz="2000" kern="1200">
                 <a:solidFill>
-                  <a:schemeClr val="accent1"/>
+                  <a:srgbClr val="FFFFFF"/>
                 </a:solidFill>
                 <a:latin typeface="+mn-lt"/>
                 <a:ea typeface="+mn-ea"/>
                 <a:cs typeface="+mn-cs"/>
               </a:rPr>
-              <a:t>okia9n</a:t>
+              <a:t>Clarify projections</a:t>
             </a:r>
           </a:p>
         </p:txBody>
       </p:sp>
       <p:cxnSp>
         <p:nvCxnSpPr>
-          <p:cNvPr id="11" name="Straight Connector 10">
+          <p:cNvPr id="137" name="Straight Connector 136">
             <a:extLst>
               <a:ext uri="{FF2B5EF4-FFF2-40B4-BE49-F238E27FC236}">
-                <a16:creationId xmlns:a16="http://schemas.microsoft.com/office/drawing/2014/main" id="{F0C57C7C-DFE9-4A1E-B7A9-DF40E63366BB}"/>
+                <a16:creationId xmlns:a16="http://schemas.microsoft.com/office/drawing/2014/main" id="{38FB9660-F42F-4313-BBC4-47C007FE484C}"/>
               </a:ext>
               <a:ext uri="{C183D7F6-B498-43B3-948B-1728B52AA6E4}">
                 <adec:decorative xmlns:adec="http://schemas.microsoft.com/office/drawing/2017/decorative" val="1"/>
@@ -4226,18 +4245,15 @@
         </p:nvCxnSpPr>
         <p:spPr>
           <a:xfrm>
-            <a:off x="4055891" y="2057399"/>
-            <a:ext cx="0" cy="2743200"/>
+            <a:off x="1191126" y="3910267"/>
+            <a:ext cx="2586790" cy="0"/>
           </a:xfrm>
           <a:prstGeom prst="line">
             <a:avLst/>
           </a:prstGeom>
-          <a:ln w="19050">
+          <a:ln w="22225">
             <a:solidFill>
-              <a:schemeClr val="tx1">
-                <a:lumMod val="85000"/>
-                <a:lumOff val="15000"/>
-              </a:schemeClr>
+              <a:srgbClr val="D9D9D9"/>
             </a:solidFill>
           </a:ln>
         </p:spPr>
@@ -4256,15 +4272,62 @@
           </a:fontRef>
         </p:style>
       </p:cxnSp>
-      <p:sp>
-        <p:nvSpPr>
-          <p:cNvPr id="4" name="Footer Placeholder 3">
+      <p:pic>
+        <p:nvPicPr>
+          <p:cNvPr id="1026" name="Picture 2" descr="Image result for isometric views">
             <a:extLst>
               <a:ext uri="{FF2B5EF4-FFF2-40B4-BE49-F238E27FC236}">
-                <a16:creationId xmlns:a16="http://schemas.microsoft.com/office/drawing/2014/main" id="{EADFB87E-2A3F-4815-8F5E-3CF3521EBF24}"/>
+                <a16:creationId xmlns:a16="http://schemas.microsoft.com/office/drawing/2014/main" id="{9AE3F868-0052-45C6-8864-53B02AD0C954}"/>
               </a:ext>
             </a:extLst>
           </p:cNvPr>
+          <p:cNvPicPr>
+            <a:picLocks noChangeAspect="1" noChangeArrowheads="1"/>
+          </p:cNvPicPr>
+          <p:nvPr/>
+        </p:nvPicPr>
+        <p:blipFill>
+          <a:blip r:embed="rId2">
+            <a:extLst>
+              <a:ext uri="{28A0092B-C50C-407E-A947-70E740481C1C}">
+                <a14:useLocalDpi xmlns:a14="http://schemas.microsoft.com/office/drawing/2010/main" val="0"/>
+              </a:ext>
+            </a:extLst>
+          </a:blip>
+          <a:srcRect/>
+          <a:stretch>
+            <a:fillRect/>
+          </a:stretch>
+        </p:blipFill>
+        <p:spPr bwMode="auto">
+          <a:xfrm>
+            <a:off x="5153822" y="2007575"/>
+            <a:ext cx="6553545" cy="2850792"/>
+          </a:xfrm>
+          <a:prstGeom prst="rect">
+            <a:avLst/>
+          </a:prstGeom>
+          <a:noFill/>
+          <a:extLst>
+            <a:ext uri="{909E8E84-426E-40DD-AFC4-6F175D3DCCD1}">
+              <a14:hiddenFill xmlns:a14="http://schemas.microsoft.com/office/drawing/2010/main">
+                <a:solidFill>
+                  <a:srgbClr val="FFFFFF"/>
+                </a:solidFill>
+              </a14:hiddenFill>
+            </a:ext>
+          </a:extLst>
+        </p:spPr>
+      </p:pic>
+      <p:sp>
+        <p:nvSpPr>
+          <p:cNvPr id="3" name="Footer Placeholder 2">
+            <a:extLst>
+              <a:ext uri="{FF2B5EF4-FFF2-40B4-BE49-F238E27FC236}">
+                <a16:creationId xmlns:a16="http://schemas.microsoft.com/office/drawing/2014/main" id="{3CC17A83-0D87-4D33-957F-E3A36E4E9621}"/>
+              </a:ext>
+            </a:extLst>
+          </p:cNvPr>
           <p:cNvSpPr>
             <a:spLocks noGrp="1"/>
           </p:cNvSpPr>
@@ -4274,8 +4337,8 @@
         </p:nvSpPr>
         <p:spPr>
           <a:xfrm>
-            <a:off x="4380588" y="6553690"/>
-            <a:ext cx="5053698" cy="274320"/>
+            <a:off x="5153822" y="6356350"/>
+            <a:ext cx="4615820" cy="365125"/>
           </a:xfrm>
         </p:spPr>
         <p:txBody>
@@ -4290,17 +4353,15 @@
               </a:spcAft>
             </a:pPr>
             <a:r>
-              <a:rPr lang="en-US" sz="1050" kern="1200">
+              <a:rPr lang="en-US" kern="1200">
                 <a:solidFill>
-                  <a:schemeClr val="tx1">
-                    <a:tint val="75000"/>
-                  </a:schemeClr>
+                  <a:srgbClr val="595959"/>
                 </a:solidFill>
                 <a:latin typeface="+mn-lt"/>
                 <a:ea typeface="+mn-ea"/>
                 <a:cs typeface="+mn-cs"/>
               </a:rPr>
-              <a:t>Unit 1 – Section 1 - Day 1</a:t>
+              <a:t>Add a footer</a:t>
             </a:r>
           </a:p>
         </p:txBody>
@@ -4308,7 +4369,7 @@
     </p:spTree>
     <p:extLst>
       <p:ext uri="{BB962C8B-B14F-4D97-AF65-F5344CB8AC3E}">
-        <p14:creationId xmlns:p14="http://schemas.microsoft.com/office/powerpoint/2010/main" val="1645033752"/>
+        <p14:creationId xmlns:p14="http://schemas.microsoft.com/office/powerpoint/2010/main" val="553240708"/>
       </p:ext>
     </p:extLst>
   </p:cSld>
@@ -4330,7 +4391,7 @@
 </p:sld>
 </file>
 
-<file path=ppt/slides/slide3.xml><?xml version="1.0" encoding="utf-8"?>
+<file path=ppt/slides/slide11.xml><?xml version="1.0" encoding="utf-8"?>
 <p:sld xmlns:a="http://schemas.openxmlformats.org/drawingml/2006/main" xmlns:r="http://schemas.openxmlformats.org/officeDocument/2006/relationships" xmlns:p="http://schemas.openxmlformats.org/presentationml/2006/main">
   <p:cSld>
     <p:bg>
@@ -4357,10 +4418,10 @@
       </p:grpSpPr>
       <p:sp>
         <p:nvSpPr>
-          <p:cNvPr id="9" name="Rectangle 8">
+          <p:cNvPr id="2052" name="Rectangle 134">
             <a:extLst>
               <a:ext uri="{FF2B5EF4-FFF2-40B4-BE49-F238E27FC236}">
-                <a16:creationId xmlns:a16="http://schemas.microsoft.com/office/drawing/2014/main" id="{8D70B121-56F4-4848-B38B-182089D909FA}"/>
+                <a16:creationId xmlns:a16="http://schemas.microsoft.com/office/drawing/2014/main" id="{AB45A142-4255-493C-8284-5D566C121B10}"/>
               </a:ext>
               <a:ext uri="{C183D7F6-B498-43B3-948B-1728B52AA6E4}">
                 <adec:decorative xmlns:adec="http://schemas.microsoft.com/office/drawing/2017/decorative" val="1"/>
@@ -4380,19 +4441,23 @@
         </p:nvSpPr>
         <p:spPr bwMode="ltGray">
           <a:xfrm>
-            <a:off x="321564" y="320040"/>
-            <a:ext cx="11548872" cy="6217920"/>
+            <a:off x="336884" y="321177"/>
+            <a:ext cx="4332307" cy="6179552"/>
           </a:xfrm>
           <a:prstGeom prst="rect">
             <a:avLst/>
           </a:prstGeom>
           <a:solidFill>
-            <a:schemeClr val="tx1">
-              <a:alpha val="8000"/>
-            </a:schemeClr>
+            <a:srgbClr val="404040">
+              <a:alpha val="89804"/>
+            </a:srgbClr>
           </a:solidFill>
           <a:ln w="127000" cap="sq" cmpd="thinThick">
-            <a:noFill/>
+            <a:solidFill>
+              <a:srgbClr val="595959">
+                <a:alpha val="80000"/>
+              </a:srgbClr>
+            </a:solidFill>
           </a:ln>
         </p:spPr>
         <p:style>
@@ -4422,7 +4487,13 @@
       </p:sp>
       <p:sp>
         <p:nvSpPr>
-          <p:cNvPr id="2" name="Title 1"/>
+          <p:cNvPr id="4" name="Title 3">
+            <a:extLst>
+              <a:ext uri="{FF2B5EF4-FFF2-40B4-BE49-F238E27FC236}">
+                <a16:creationId xmlns:a16="http://schemas.microsoft.com/office/drawing/2014/main" id="{6E72D690-3946-41C4-B01B-C2857A0A1E69}"/>
+              </a:ext>
+            </a:extLst>
+          </p:cNvPr>
           <p:cNvSpPr>
             <a:spLocks noGrp="1"/>
           </p:cNvSpPr>
@@ -4432,34 +4503,82 @@
         </p:nvSpPr>
         <p:spPr>
           <a:xfrm>
-            <a:off x="838200" y="963877"/>
-            <a:ext cx="3494362" cy="4930246"/>
-          </a:xfrm>
-        </p:spPr>
-        <p:txBody>
-          <a:bodyPr>
+            <a:off x="674237" y="914400"/>
+            <a:ext cx="3657600" cy="2887579"/>
+          </a:xfrm>
+        </p:spPr>
+        <p:txBody>
+          <a:bodyPr vert="horz" lIns="91440" tIns="45720" rIns="91440" bIns="45720" rtlCol="0" anchor="b">
             <a:normAutofit/>
           </a:bodyPr>
           <a:lstStyle/>
           <a:p>
-            <a:pPr algn="r"/>
-            <a:r>
-              <a:rPr lang="en-US">
+            <a:pPr algn="ctr"/>
+            <a:r>
+              <a:rPr lang="en-US" sz="4800" kern="1200">
                 <a:solidFill>
-                  <a:schemeClr val="accent1"/>
+                  <a:srgbClr val="FFFFFF"/>
                 </a:solidFill>
+                <a:latin typeface="+mj-lt"/>
+                <a:ea typeface="+mj-ea"/>
+                <a:cs typeface="+mj-cs"/>
               </a:rPr>
-              <a:t>The big idea</a:t>
+              <a:t>Why technical lettering?</a:t>
+            </a:r>
+          </a:p>
+        </p:txBody>
+      </p:sp>
+      <p:sp>
+        <p:nvSpPr>
+          <p:cNvPr id="5" name="Content Placeholder 4">
+            <a:extLst>
+              <a:ext uri="{FF2B5EF4-FFF2-40B4-BE49-F238E27FC236}">
+                <a16:creationId xmlns:a16="http://schemas.microsoft.com/office/drawing/2014/main" id="{A2540170-1DBD-4347-B779-0831D3F5A786}"/>
+              </a:ext>
+            </a:extLst>
+          </p:cNvPr>
+          <p:cNvSpPr>
+            <a:spLocks noGrp="1"/>
+          </p:cNvSpPr>
+          <p:nvPr>
+            <p:ph idx="1"/>
+          </p:nvPr>
+        </p:nvSpPr>
+        <p:spPr>
+          <a:xfrm>
+            <a:off x="674237" y="4170501"/>
+            <a:ext cx="3657600" cy="1525597"/>
+          </a:xfrm>
+        </p:spPr>
+        <p:txBody>
+          <a:bodyPr vert="horz" lIns="91440" tIns="45720" rIns="91440" bIns="45720" rtlCol="0">
+            <a:normAutofit/>
+          </a:bodyPr>
+          <a:lstStyle/>
+          <a:p>
+            <a:pPr marL="0" indent="0" algn="ctr">
+              <a:buNone/>
+            </a:pPr>
+            <a:r>
+              <a:rPr lang="en-US" sz="2000" kern="1200">
+                <a:solidFill>
+                  <a:srgbClr val="FFFFFF"/>
+                </a:solidFill>
+                <a:latin typeface="+mn-lt"/>
+                <a:ea typeface="+mn-ea"/>
+                <a:cs typeface="+mn-cs"/>
+              </a:rPr>
+              <a:t>Notes to specify materials and/or processes</a:t>
             </a:r>
           </a:p>
         </p:txBody>
       </p:sp>
       <p:cxnSp>
         <p:nvCxnSpPr>
-          <p:cNvPr id="11" name="Straight Connector 10">
+          <p:cNvPr id="2053" name="Straight Connector 136">
             <a:extLst>
               <a:ext uri="{FF2B5EF4-FFF2-40B4-BE49-F238E27FC236}">
-                <a16:creationId xmlns:a16="http://schemas.microsoft.com/office/drawing/2014/main" id="{2D72A2C9-F3CA-4216-8BAD-FA4C970C3C4E}"/>
+                <a16:creationId xmlns:a16="http://schemas.microsoft.com/office/drawing/2014/main" id="{38FB9660-F42F-4313-BBC4-47C007FE484C}"/>
               </a:ext>
               <a:ext uri="{C183D7F6-B498-43B3-948B-1728B52AA6E4}">
                 <adec:decorative xmlns:adec="http://schemas.microsoft.com/office/drawing/2017/decorative" val="1"/>
@@ -4479,18 +4598,15 @@
         </p:nvCxnSpPr>
         <p:spPr>
           <a:xfrm>
-            <a:off x="4654296" y="2057400"/>
-            <a:ext cx="0" cy="2743200"/>
+            <a:off x="1191126" y="3910267"/>
+            <a:ext cx="2586790" cy="0"/>
           </a:xfrm>
           <a:prstGeom prst="line">
             <a:avLst/>
           </a:prstGeom>
-          <a:ln w="19050">
+          <a:ln w="22225">
             <a:solidFill>
-              <a:schemeClr val="tx1">
-                <a:lumMod val="85000"/>
-                <a:lumOff val="15000"/>
-              </a:schemeClr>
+              <a:srgbClr val="D9D9D9"/>
             </a:solidFill>
           </a:ln>
         </p:spPr>
@@ -4509,62 +4625,62 @@
           </a:fontRef>
         </p:style>
       </p:cxnSp>
-      <p:sp>
-        <p:nvSpPr>
-          <p:cNvPr id="3" name="Content Placeholder 2"/>
-          <p:cNvSpPr>
-            <a:spLocks noGrp="1"/>
-          </p:cNvSpPr>
-          <p:nvPr>
-            <p:ph idx="1"/>
-          </p:nvPr>
-        </p:nvSpPr>
-        <p:spPr>
-          <a:xfrm>
-            <a:off x="4976031" y="963877"/>
-            <a:ext cx="6377769" cy="4930246"/>
-          </a:xfrm>
-        </p:spPr>
-        <p:txBody>
-          <a:bodyPr anchor="ctr">
-            <a:normAutofit/>
-          </a:bodyPr>
-          <a:lstStyle/>
-          <a:p>
-            <a:r>
-              <a:rPr lang="en-US" sz="2400">
-                <a:cs typeface="Arial" pitchFamily="34" charset="0"/>
-              </a:rPr>
-              <a:t>There are different styles of lettering and industry standards</a:t>
-            </a:r>
-          </a:p>
-          <a:p>
-            <a:r>
-              <a:rPr lang="en-US" sz="2400">
-                <a:cs typeface="Arial" pitchFamily="34" charset="0"/>
-              </a:rPr>
-              <a:t>Guidelines are used for height and slope of letters</a:t>
-            </a:r>
-          </a:p>
-          <a:p>
-            <a:r>
-              <a:rPr lang="en-US" sz="2400">
-                <a:cs typeface="Arial" pitchFamily="34" charset="0"/>
-              </a:rPr>
-              <a:t>Single-stroke Gothic letters are commonly used in industry</a:t>
-            </a:r>
-          </a:p>
-        </p:txBody>
-      </p:sp>
-      <p:sp>
-        <p:nvSpPr>
-          <p:cNvPr id="4" name="Footer Placeholder 3">
+      <p:pic>
+        <p:nvPicPr>
+          <p:cNvPr id="2050" name="Picture 2" descr="Image result for technical drawing notes">
             <a:extLst>
               <a:ext uri="{FF2B5EF4-FFF2-40B4-BE49-F238E27FC236}">
-                <a16:creationId xmlns:a16="http://schemas.microsoft.com/office/drawing/2014/main" id="{EADFB87E-2A3F-4815-8F5E-3CF3521EBF24}"/>
+                <a16:creationId xmlns:a16="http://schemas.microsoft.com/office/drawing/2014/main" id="{960131F1-B49C-44A5-88EE-17DEF47A8BBD}"/>
               </a:ext>
             </a:extLst>
           </p:cNvPr>
+          <p:cNvPicPr>
+            <a:picLocks noChangeAspect="1" noChangeArrowheads="1"/>
+          </p:cNvPicPr>
+          <p:nvPr/>
+        </p:nvPicPr>
+        <p:blipFill>
+          <a:blip r:embed="rId2">
+            <a:extLst>
+              <a:ext uri="{28A0092B-C50C-407E-A947-70E740481C1C}">
+                <a14:useLocalDpi xmlns:a14="http://schemas.microsoft.com/office/drawing/2010/main" val="0"/>
+              </a:ext>
+            </a:extLst>
+          </a:blip>
+          <a:srcRect/>
+          <a:stretch>
+            <a:fillRect/>
+          </a:stretch>
+        </p:blipFill>
+        <p:spPr bwMode="auto">
+          <a:xfrm>
+            <a:off x="5153822" y="975392"/>
+            <a:ext cx="6553545" cy="4915158"/>
+          </a:xfrm>
+          <a:prstGeom prst="rect">
+            <a:avLst/>
+          </a:prstGeom>
+          <a:noFill/>
+          <a:extLst>
+            <a:ext uri="{909E8E84-426E-40DD-AFC4-6F175D3DCCD1}">
+              <a14:hiddenFill xmlns:a14="http://schemas.microsoft.com/office/drawing/2010/main">
+                <a:solidFill>
+                  <a:srgbClr val="FFFFFF"/>
+                </a:solidFill>
+              </a14:hiddenFill>
+            </a:ext>
+          </a:extLst>
+        </p:spPr>
+      </p:pic>
+      <p:sp>
+        <p:nvSpPr>
+          <p:cNvPr id="3" name="Footer Placeholder 2">
+            <a:extLst>
+              <a:ext uri="{FF2B5EF4-FFF2-40B4-BE49-F238E27FC236}">
+                <a16:creationId xmlns:a16="http://schemas.microsoft.com/office/drawing/2014/main" id="{3CC17A83-0D87-4D33-957F-E3A36E4E9621}"/>
+              </a:ext>
+            </a:extLst>
+          </p:cNvPr>
           <p:cNvSpPr>
             <a:spLocks noGrp="1"/>
           </p:cNvSpPr>
@@ -4574,30 +4690,31 @@
         </p:nvSpPr>
         <p:spPr>
           <a:xfrm>
-            <a:off x="4976031" y="6033479"/>
-            <a:ext cx="5259985" cy="365125"/>
-          </a:xfrm>
-        </p:spPr>
-        <p:txBody>
-          <a:bodyPr>
+            <a:off x="5153822" y="6356350"/>
+            <a:ext cx="4615820" cy="365125"/>
+          </a:xfrm>
+        </p:spPr>
+        <p:txBody>
+          <a:bodyPr vert="horz" lIns="91440" tIns="45720" rIns="91440" bIns="45720" rtlCol="0" anchor="ctr">
             <a:normAutofit/>
           </a:bodyPr>
           <a:lstStyle/>
           <a:p>
-            <a:pPr algn="l">
+            <a:pPr algn="l" defTabSz="914400">
               <a:spcAft>
                 <a:spcPts val="600"/>
               </a:spcAft>
             </a:pPr>
             <a:r>
-              <a:rPr lang="en-US" sz="1050">
+              <a:rPr lang="en-US" kern="1200">
                 <a:solidFill>
-                  <a:schemeClr val="tx1">
-                    <a:alpha val="80000"/>
-                  </a:schemeClr>
+                  <a:srgbClr val="595959"/>
                 </a:solidFill>
+                <a:latin typeface="+mn-lt"/>
+                <a:ea typeface="+mn-ea"/>
+                <a:cs typeface="+mn-cs"/>
               </a:rPr>
-              <a:t>Unit 1 – Section 1 - Day 1</a:t>
+              <a:t>Add a footer</a:t>
             </a:r>
           </a:p>
         </p:txBody>
@@ -4605,7 +4722,7 @@
     </p:spTree>
     <p:extLst>
       <p:ext uri="{BB962C8B-B14F-4D97-AF65-F5344CB8AC3E}">
-        <p14:creationId xmlns:p14="http://schemas.microsoft.com/office/powerpoint/2010/main" val="78530218"/>
+        <p14:creationId xmlns:p14="http://schemas.microsoft.com/office/powerpoint/2010/main" val="3583702976"/>
       </p:ext>
     </p:extLst>
   </p:cSld>
@@ -4627,1027 +4744,7 @@
 </p:sld>
 </file>
 
-<file path=ppt/slides/slide4.xml><?xml version="1.0" encoding="utf-8"?>
-<p:sld xmlns:a="http://schemas.openxmlformats.org/drawingml/2006/main" xmlns:r="http://schemas.openxmlformats.org/officeDocument/2006/relationships" xmlns:p="http://schemas.openxmlformats.org/presentationml/2006/main">
-  <p:cSld>
-    <p:bg>
-      <p:bgPr>
-        <a:solidFill>
-          <a:schemeClr val="bg1"/>
-        </a:solidFill>
-        <a:effectLst/>
-      </p:bgPr>
-    </p:bg>
-    <p:spTree>
-      <p:nvGrpSpPr>
-        <p:cNvPr id="1" name=""/>
-        <p:cNvGrpSpPr/>
-        <p:nvPr/>
-      </p:nvGrpSpPr>
-      <p:grpSpPr>
-        <a:xfrm>
-          <a:off x="0" y="0"/>
-          <a:ext cx="0" cy="0"/>
-          <a:chOff x="0" y="0"/>
-          <a:chExt cx="0" cy="0"/>
-        </a:xfrm>
-      </p:grpSpPr>
-      <p:sp>
-        <p:nvSpPr>
-          <p:cNvPr id="9" name="Rectangle 8">
-            <a:extLst>
-              <a:ext uri="{FF2B5EF4-FFF2-40B4-BE49-F238E27FC236}">
-                <a16:creationId xmlns:a16="http://schemas.microsoft.com/office/drawing/2014/main" id="{8D70B121-56F4-4848-B38B-182089D909FA}"/>
-              </a:ext>
-              <a:ext uri="{C183D7F6-B498-43B3-948B-1728B52AA6E4}">
-                <adec:decorative xmlns:adec="http://schemas.microsoft.com/office/drawing/2017/decorative" val="1"/>
-              </a:ext>
-            </a:extLst>
-          </p:cNvPr>
-          <p:cNvSpPr>
-            <a:spLocks noGrp="1" noRot="1" noChangeAspect="1" noMove="1" noResize="1" noEditPoints="1" noAdjustHandles="1" noChangeArrowheads="1" noChangeShapeType="1" noTextEdit="1"/>
-          </p:cNvSpPr>
-          <p:nvPr>
-            <p:extLst>
-              <p:ext uri="{386F3935-93C4-4BCD-93E2-E3B085C9AB24}">
-                <p16:designElem xmlns:p16="http://schemas.microsoft.com/office/powerpoint/2015/main" val="1"/>
-              </p:ext>
-            </p:extLst>
-          </p:nvPr>
-        </p:nvSpPr>
-        <p:spPr bwMode="ltGray">
-          <a:xfrm>
-            <a:off x="321564" y="320040"/>
-            <a:ext cx="11548872" cy="6217920"/>
-          </a:xfrm>
-          <a:prstGeom prst="rect">
-            <a:avLst/>
-          </a:prstGeom>
-          <a:solidFill>
-            <a:schemeClr val="tx1">
-              <a:alpha val="8000"/>
-            </a:schemeClr>
-          </a:solidFill>
-          <a:ln w="127000" cap="sq" cmpd="thinThick">
-            <a:noFill/>
-          </a:ln>
-        </p:spPr>
-        <p:style>
-          <a:lnRef idx="2">
-            <a:schemeClr val="accent1">
-              <a:shade val="50000"/>
-            </a:schemeClr>
-          </a:lnRef>
-          <a:fillRef idx="1">
-            <a:schemeClr val="accent1"/>
-          </a:fillRef>
-          <a:effectRef idx="0">
-            <a:schemeClr val="accent1"/>
-          </a:effectRef>
-          <a:fontRef idx="minor">
-            <a:schemeClr val="lt1"/>
-          </a:fontRef>
-        </p:style>
-        <p:txBody>
-          <a:bodyPr rtlCol="0" anchor="ctr"/>
-          <a:lstStyle/>
-          <a:p>
-            <a:pPr algn="ctr"/>
-            <a:endParaRPr lang="en-US"/>
-          </a:p>
-        </p:txBody>
-      </p:sp>
-      <p:sp>
-        <p:nvSpPr>
-          <p:cNvPr id="2" name="Title 1">
-            <a:extLst>
-              <a:ext uri="{FF2B5EF4-FFF2-40B4-BE49-F238E27FC236}">
-                <a16:creationId xmlns:a16="http://schemas.microsoft.com/office/drawing/2014/main" id="{716F2B93-A2BD-40E2-9FD0-F93D173411A3}"/>
-              </a:ext>
-            </a:extLst>
-          </p:cNvPr>
-          <p:cNvSpPr>
-            <a:spLocks noGrp="1"/>
-          </p:cNvSpPr>
-          <p:nvPr>
-            <p:ph type="title"/>
-          </p:nvPr>
-        </p:nvSpPr>
-        <p:spPr>
-          <a:xfrm>
-            <a:off x="838200" y="963877"/>
-            <a:ext cx="3494362" cy="4930246"/>
-          </a:xfrm>
-        </p:spPr>
-        <p:txBody>
-          <a:bodyPr>
-            <a:normAutofit/>
-          </a:bodyPr>
-          <a:lstStyle/>
-          <a:p>
-            <a:pPr algn="r"/>
-            <a:r>
-              <a:rPr lang="en-US">
-                <a:solidFill>
-                  <a:schemeClr val="accent1"/>
-                </a:solidFill>
-              </a:rPr>
-              <a:t>What is lettering</a:t>
-            </a:r>
-          </a:p>
-        </p:txBody>
-      </p:sp>
-      <p:cxnSp>
-        <p:nvCxnSpPr>
-          <p:cNvPr id="11" name="Straight Connector 10">
-            <a:extLst>
-              <a:ext uri="{FF2B5EF4-FFF2-40B4-BE49-F238E27FC236}">
-                <a16:creationId xmlns:a16="http://schemas.microsoft.com/office/drawing/2014/main" id="{2D72A2C9-F3CA-4216-8BAD-FA4C970C3C4E}"/>
-              </a:ext>
-              <a:ext uri="{C183D7F6-B498-43B3-948B-1728B52AA6E4}">
-                <adec:decorative xmlns:adec="http://schemas.microsoft.com/office/drawing/2017/decorative" val="1"/>
-              </a:ext>
-            </a:extLst>
-          </p:cNvPr>
-          <p:cNvCxnSpPr>
-            <a:cxnSpLocks noGrp="1" noRot="1" noChangeAspect="1" noMove="1" noResize="1" noEditPoints="1" noAdjustHandles="1" noChangeArrowheads="1" noChangeShapeType="1"/>
-          </p:cNvCxnSpPr>
-          <p:nvPr>
-            <p:extLst>
-              <p:ext uri="{386F3935-93C4-4BCD-93E2-E3B085C9AB24}">
-                <p16:designElem xmlns:p16="http://schemas.microsoft.com/office/powerpoint/2015/main" val="1"/>
-              </p:ext>
-            </p:extLst>
-          </p:nvPr>
-        </p:nvCxnSpPr>
-        <p:spPr>
-          <a:xfrm>
-            <a:off x="4654296" y="2057400"/>
-            <a:ext cx="0" cy="2743200"/>
-          </a:xfrm>
-          <a:prstGeom prst="line">
-            <a:avLst/>
-          </a:prstGeom>
-          <a:ln w="19050">
-            <a:solidFill>
-              <a:schemeClr val="tx1">
-                <a:lumMod val="85000"/>
-                <a:lumOff val="15000"/>
-              </a:schemeClr>
-            </a:solidFill>
-          </a:ln>
-        </p:spPr>
-        <p:style>
-          <a:lnRef idx="1">
-            <a:schemeClr val="accent1"/>
-          </a:lnRef>
-          <a:fillRef idx="0">
-            <a:schemeClr val="accent1"/>
-          </a:fillRef>
-          <a:effectRef idx="0">
-            <a:schemeClr val="accent1"/>
-          </a:effectRef>
-          <a:fontRef idx="minor">
-            <a:schemeClr val="tx1"/>
-          </a:fontRef>
-        </p:style>
-      </p:cxnSp>
-      <p:sp>
-        <p:nvSpPr>
-          <p:cNvPr id="3" name="Content Placeholder 2">
-            <a:extLst>
-              <a:ext uri="{FF2B5EF4-FFF2-40B4-BE49-F238E27FC236}">
-                <a16:creationId xmlns:a16="http://schemas.microsoft.com/office/drawing/2014/main" id="{E9311B71-3167-477F-B1AB-5C48044BC8E1}"/>
-              </a:ext>
-            </a:extLst>
-          </p:cNvPr>
-          <p:cNvSpPr>
-            <a:spLocks noGrp="1"/>
-          </p:cNvSpPr>
-          <p:nvPr>
-            <p:ph idx="1"/>
-          </p:nvPr>
-        </p:nvSpPr>
-        <p:spPr>
-          <a:xfrm>
-            <a:off x="4976031" y="963877"/>
-            <a:ext cx="6377769" cy="4930246"/>
-          </a:xfrm>
-        </p:spPr>
-        <p:txBody>
-          <a:bodyPr anchor="ctr">
-            <a:normAutofit/>
-          </a:bodyPr>
-          <a:lstStyle/>
-          <a:p>
-            <a:r>
-              <a:rPr lang="en-US" sz="2400"/>
-              <a:t>Purpose is to clarify the views or projections</a:t>
-            </a:r>
-          </a:p>
-          <a:p>
-            <a:r>
-              <a:rPr lang="en-US" sz="2400"/>
-              <a:t>Notes may specify materials and processes</a:t>
-            </a:r>
-          </a:p>
-          <a:p>
-            <a:r>
-              <a:rPr lang="en-US" sz="2400"/>
-              <a:t>Most drafters are required to letter drawings freehand</a:t>
-            </a:r>
-          </a:p>
-          <a:p>
-            <a:r>
-              <a:rPr lang="en-US" sz="2400"/>
-              <a:t>Lettering is about 20% of manual work for any drafter</a:t>
-            </a:r>
-          </a:p>
-          <a:p>
-            <a:pPr marL="411480" lvl="1" indent="0">
-              <a:buNone/>
-            </a:pPr>
-            <a:endParaRPr lang="en-US" dirty="0"/>
-          </a:p>
-          <a:p>
-            <a:endParaRPr lang="en-US" sz="2400"/>
-          </a:p>
-          <a:p>
-            <a:endParaRPr lang="en-US" sz="2400"/>
-          </a:p>
-        </p:txBody>
-      </p:sp>
-      <p:sp>
-        <p:nvSpPr>
-          <p:cNvPr id="4" name="Footer Placeholder 3">
-            <a:extLst>
-              <a:ext uri="{FF2B5EF4-FFF2-40B4-BE49-F238E27FC236}">
-                <a16:creationId xmlns:a16="http://schemas.microsoft.com/office/drawing/2014/main" id="{DA40730A-829B-4DFE-8CAE-D606FCE1126E}"/>
-              </a:ext>
-            </a:extLst>
-          </p:cNvPr>
-          <p:cNvSpPr>
-            <a:spLocks noGrp="1"/>
-          </p:cNvSpPr>
-          <p:nvPr>
-            <p:ph type="ftr" sz="quarter" idx="11"/>
-          </p:nvPr>
-        </p:nvSpPr>
-        <p:spPr>
-          <a:xfrm>
-            <a:off x="4976031" y="6033479"/>
-            <a:ext cx="5259985" cy="365125"/>
-          </a:xfrm>
-        </p:spPr>
-        <p:txBody>
-          <a:bodyPr>
-            <a:normAutofit/>
-          </a:bodyPr>
-          <a:lstStyle/>
-          <a:p>
-            <a:pPr algn="l">
-              <a:spcAft>
-                <a:spcPts val="600"/>
-              </a:spcAft>
-            </a:pPr>
-            <a:r>
-              <a:rPr lang="en-US" sz="1050">
-                <a:solidFill>
-                  <a:schemeClr val="tx1">
-                    <a:alpha val="80000"/>
-                  </a:schemeClr>
-                </a:solidFill>
-              </a:rPr>
-              <a:t>Add a footer</a:t>
-            </a:r>
-          </a:p>
-        </p:txBody>
-      </p:sp>
-    </p:spTree>
-    <p:extLst>
-      <p:ext uri="{BB962C8B-B14F-4D97-AF65-F5344CB8AC3E}">
-        <p14:creationId xmlns:p14="http://schemas.microsoft.com/office/powerpoint/2010/main" val="1269551219"/>
-      </p:ext>
-    </p:extLst>
-  </p:cSld>
-  <p:clrMapOvr>
-    <a:masterClrMapping/>
-  </p:clrMapOvr>
-  <mc:AlternateContent xmlns:mc="http://schemas.openxmlformats.org/markup-compatibility/2006" xmlns:p14="http://schemas.microsoft.com/office/powerpoint/2010/main">
-    <mc:Choice Requires="p14">
-      <p:transition spd="med" p14:dur="700">
-        <p:fade/>
-      </p:transition>
-    </mc:Choice>
-    <mc:Fallback xmlns="">
-      <p:transition spd="med">
-        <p:fade/>
-      </p:transition>
-    </mc:Fallback>
-  </mc:AlternateContent>
-</p:sld>
-</file>
-
-<file path=ppt/slides/slide5.xml><?xml version="1.0" encoding="utf-8"?>
-<p:sld xmlns:a="http://schemas.openxmlformats.org/drawingml/2006/main" xmlns:r="http://schemas.openxmlformats.org/officeDocument/2006/relationships" xmlns:p="http://schemas.openxmlformats.org/presentationml/2006/main">
-  <p:cSld>
-    <p:bg>
-      <p:bgPr>
-        <a:solidFill>
-          <a:schemeClr val="bg1"/>
-        </a:solidFill>
-        <a:effectLst/>
-      </p:bgPr>
-    </p:bg>
-    <p:spTree>
-      <p:nvGrpSpPr>
-        <p:cNvPr id="1" name=""/>
-        <p:cNvGrpSpPr/>
-        <p:nvPr/>
-      </p:nvGrpSpPr>
-      <p:grpSpPr>
-        <a:xfrm>
-          <a:off x="0" y="0"/>
-          <a:ext cx="0" cy="0"/>
-          <a:chOff x="0" y="0"/>
-          <a:chExt cx="0" cy="0"/>
-        </a:xfrm>
-      </p:grpSpPr>
-      <p:sp>
-        <p:nvSpPr>
-          <p:cNvPr id="71" name="Rectangle 70">
-            <a:extLst>
-              <a:ext uri="{FF2B5EF4-FFF2-40B4-BE49-F238E27FC236}">
-                <a16:creationId xmlns:a16="http://schemas.microsoft.com/office/drawing/2014/main" id="{4038CB10-1F5C-4D54-9DF7-12586DE5B007}"/>
-              </a:ext>
-              <a:ext uri="{C183D7F6-B498-43B3-948B-1728B52AA6E4}">
-                <adec:decorative xmlns:adec="http://schemas.microsoft.com/office/drawing/2017/decorative" val="1"/>
-              </a:ext>
-            </a:extLst>
-          </p:cNvPr>
-          <p:cNvSpPr>
-            <a:spLocks noGrp="1" noRot="1" noChangeAspect="1" noMove="1" noResize="1" noEditPoints="1" noAdjustHandles="1" noChangeArrowheads="1" noChangeShapeType="1" noTextEdit="1"/>
-          </p:cNvSpPr>
-          <p:nvPr>
-            <p:extLst>
-              <p:ext uri="{386F3935-93C4-4BCD-93E2-E3B085C9AB24}">
-                <p16:designElem xmlns:p16="http://schemas.microsoft.com/office/powerpoint/2015/main" val="1"/>
-              </p:ext>
-            </p:extLst>
-          </p:nvPr>
-        </p:nvSpPr>
-        <p:spPr>
-          <a:xfrm>
-            <a:off x="327546" y="4572000"/>
-            <a:ext cx="7058307" cy="1964266"/>
-          </a:xfrm>
-          <a:prstGeom prst="rect">
-            <a:avLst/>
-          </a:prstGeom>
-          <a:solidFill>
-            <a:schemeClr val="accent1"/>
-          </a:solidFill>
-          <a:ln>
-            <a:noFill/>
-          </a:ln>
-        </p:spPr>
-        <p:style>
-          <a:lnRef idx="2">
-            <a:schemeClr val="accent1">
-              <a:shade val="50000"/>
-            </a:schemeClr>
-          </a:lnRef>
-          <a:fillRef idx="1">
-            <a:schemeClr val="accent1"/>
-          </a:fillRef>
-          <a:effectRef idx="0">
-            <a:schemeClr val="accent1"/>
-          </a:effectRef>
-          <a:fontRef idx="minor">
-            <a:schemeClr val="lt1"/>
-          </a:fontRef>
-        </p:style>
-        <p:txBody>
-          <a:bodyPr rtlCol="0" anchor="ctr"/>
-          <a:lstStyle/>
-          <a:p>
-            <a:pPr marL="0" marR="0" lvl="0" indent="0" algn="ctr" defTabSz="914400" rtl="0" eaLnBrk="1" fontAlgn="auto" latinLnBrk="0" hangingPunct="1">
-              <a:lnSpc>
-                <a:spcPct val="100000"/>
-              </a:lnSpc>
-              <a:spcBef>
-                <a:spcPts val="0"/>
-              </a:spcBef>
-              <a:spcAft>
-                <a:spcPts val="0"/>
-              </a:spcAft>
-              <a:buClrTx/>
-              <a:buSzTx/>
-              <a:buFontTx/>
-              <a:buNone/>
-              <a:tabLst/>
-              <a:defRPr/>
-            </a:pPr>
-            <a:endParaRPr kumimoji="0" lang="en-US" sz="1800" b="0" i="0" u="none" strike="noStrike" kern="1200" cap="none" spc="0" normalizeH="0" baseline="0" noProof="0">
-              <a:ln>
-                <a:noFill/>
-              </a:ln>
-              <a:solidFill>
-                <a:prstClr val="white"/>
-              </a:solidFill>
-              <a:effectLst/>
-              <a:uLnTx/>
-              <a:uFillTx/>
-              <a:latin typeface="Calibri" panose="020F0502020204030204"/>
-              <a:ea typeface="+mn-ea"/>
-              <a:cs typeface="+mn-cs"/>
-            </a:endParaRPr>
-          </a:p>
-        </p:txBody>
-      </p:sp>
-      <p:sp>
-        <p:nvSpPr>
-          <p:cNvPr id="2" name="Title 1">
-            <a:extLst>
-              <a:ext uri="{FF2B5EF4-FFF2-40B4-BE49-F238E27FC236}">
-                <a16:creationId xmlns:a16="http://schemas.microsoft.com/office/drawing/2014/main" id="{C0CD3824-41FA-4546-AFCD-2A01FEF6F1C3}"/>
-              </a:ext>
-            </a:extLst>
-          </p:cNvPr>
-          <p:cNvSpPr>
-            <a:spLocks noGrp="1"/>
-          </p:cNvSpPr>
-          <p:nvPr>
-            <p:ph type="title"/>
-          </p:nvPr>
-        </p:nvSpPr>
-        <p:spPr>
-          <a:xfrm>
-            <a:off x="524256" y="4767072"/>
-            <a:ext cx="6594189" cy="1625210"/>
-          </a:xfrm>
-        </p:spPr>
-        <p:txBody>
-          <a:bodyPr>
-            <a:normAutofit/>
-          </a:bodyPr>
-          <a:lstStyle/>
-          <a:p>
-            <a:pPr algn="r"/>
-            <a:r>
-              <a:rPr lang="en-US">
-                <a:solidFill>
-                  <a:srgbClr val="FFFFFF"/>
-                </a:solidFill>
-              </a:rPr>
-              <a:t>Lettering technique</a:t>
-            </a:r>
-          </a:p>
-        </p:txBody>
-      </p:sp>
-      <p:pic>
-        <p:nvPicPr>
-          <p:cNvPr id="1026" name="Picture 2" descr="Image result for drafting lettering technique">
-            <a:extLst>
-              <a:ext uri="{FF2B5EF4-FFF2-40B4-BE49-F238E27FC236}">
-                <a16:creationId xmlns:a16="http://schemas.microsoft.com/office/drawing/2014/main" id="{99EDA05A-8342-458F-ABAD-41079AAAAE16}"/>
-              </a:ext>
-            </a:extLst>
-          </p:cNvPr>
-          <p:cNvPicPr>
-            <a:picLocks noChangeAspect="1" noChangeArrowheads="1"/>
-          </p:cNvPicPr>
-          <p:nvPr/>
-        </p:nvPicPr>
-        <p:blipFill rotWithShape="1">
-          <a:blip r:embed="rId2">
-            <a:extLst>
-              <a:ext uri="{28A0092B-C50C-407E-A947-70E740481C1C}">
-                <a14:useLocalDpi xmlns:a14="http://schemas.microsoft.com/office/drawing/2010/main" val="0"/>
-              </a:ext>
-            </a:extLst>
-          </a:blip>
-          <a:srcRect t="423" r="1" b="21989"/>
-          <a:stretch/>
-        </p:blipFill>
-        <p:spPr bwMode="auto">
-          <a:xfrm>
-            <a:off x="327547" y="321733"/>
-            <a:ext cx="7058306" cy="4107392"/>
-          </a:xfrm>
-          <a:prstGeom prst="rect">
-            <a:avLst/>
-          </a:prstGeom>
-          <a:noFill/>
-          <a:extLst>
-            <a:ext uri="{909E8E84-426E-40DD-AFC4-6F175D3DCCD1}">
-              <a14:hiddenFill xmlns:a14="http://schemas.microsoft.com/office/drawing/2010/main">
-                <a:solidFill>
-                  <a:srgbClr val="FFFFFF"/>
-                </a:solidFill>
-              </a14:hiddenFill>
-            </a:ext>
-          </a:extLst>
-        </p:spPr>
-      </p:pic>
-      <p:sp>
-        <p:nvSpPr>
-          <p:cNvPr id="4" name="Footer Placeholder 3">
-            <a:extLst>
-              <a:ext uri="{FF2B5EF4-FFF2-40B4-BE49-F238E27FC236}">
-                <a16:creationId xmlns:a16="http://schemas.microsoft.com/office/drawing/2014/main" id="{F2C807B6-1EF7-457A-9AA4-A8D575B1919D}"/>
-              </a:ext>
-            </a:extLst>
-          </p:cNvPr>
-          <p:cNvSpPr>
-            <a:spLocks noGrp="1"/>
-          </p:cNvSpPr>
-          <p:nvPr>
-            <p:ph type="ftr" sz="quarter" idx="11"/>
-          </p:nvPr>
-        </p:nvSpPr>
-        <p:spPr>
-          <a:xfrm>
-            <a:off x="524256" y="6535157"/>
-            <a:ext cx="6594189" cy="274320"/>
-          </a:xfrm>
-        </p:spPr>
-        <p:txBody>
-          <a:bodyPr>
-            <a:normAutofit/>
-          </a:bodyPr>
-          <a:lstStyle/>
-          <a:p>
-            <a:pPr algn="r">
-              <a:spcAft>
-                <a:spcPts val="600"/>
-              </a:spcAft>
-            </a:pPr>
-            <a:r>
-              <a:rPr lang="en-US">
-                <a:solidFill>
-                  <a:prstClr val="black">
-                    <a:tint val="75000"/>
-                  </a:prstClr>
-                </a:solidFill>
-              </a:rPr>
-              <a:t>Add a footer</a:t>
-            </a:r>
-          </a:p>
-        </p:txBody>
-      </p:sp>
-      <p:sp>
-        <p:nvSpPr>
-          <p:cNvPr id="1029" name="Rectangle 72">
-            <a:extLst>
-              <a:ext uri="{FF2B5EF4-FFF2-40B4-BE49-F238E27FC236}">
-                <a16:creationId xmlns:a16="http://schemas.microsoft.com/office/drawing/2014/main" id="{73ED6512-6858-4552-B699-9A97FE9A4EA2}"/>
-              </a:ext>
-              <a:ext uri="{C183D7F6-B498-43B3-948B-1728B52AA6E4}">
-                <adec:decorative xmlns:adec="http://schemas.microsoft.com/office/drawing/2017/decorative" val="1"/>
-              </a:ext>
-            </a:extLst>
-          </p:cNvPr>
-          <p:cNvSpPr>
-            <a:spLocks noGrp="1" noRot="1" noChangeAspect="1" noMove="1" noResize="1" noEditPoints="1" noAdjustHandles="1" noChangeArrowheads="1" noChangeShapeType="1" noTextEdit="1"/>
-          </p:cNvSpPr>
-          <p:nvPr>
-            <p:extLst>
-              <p:ext uri="{386F3935-93C4-4BCD-93E2-E3B085C9AB24}">
-                <p16:designElem xmlns:p16="http://schemas.microsoft.com/office/powerpoint/2015/main" val="1"/>
-              </p:ext>
-            </p:extLst>
-          </p:nvPr>
-        </p:nvSpPr>
-        <p:spPr>
-          <a:xfrm>
-            <a:off x="7534655" y="321732"/>
-            <a:ext cx="4335613" cy="6214534"/>
-          </a:xfrm>
-          <a:prstGeom prst="rect">
-            <a:avLst/>
-          </a:prstGeom>
-          <a:solidFill>
-            <a:srgbClr val="404040"/>
-          </a:solidFill>
-          <a:ln>
-            <a:noFill/>
-          </a:ln>
-        </p:spPr>
-        <p:style>
-          <a:lnRef idx="2">
-            <a:schemeClr val="accent1">
-              <a:shade val="50000"/>
-            </a:schemeClr>
-          </a:lnRef>
-          <a:fillRef idx="1">
-            <a:schemeClr val="accent1"/>
-          </a:fillRef>
-          <a:effectRef idx="0">
-            <a:schemeClr val="accent1"/>
-          </a:effectRef>
-          <a:fontRef idx="minor">
-            <a:schemeClr val="lt1"/>
-          </a:fontRef>
-        </p:style>
-        <p:txBody>
-          <a:bodyPr rtlCol="0" anchor="ctr"/>
-          <a:lstStyle/>
-          <a:p>
-            <a:pPr marL="0" marR="0" lvl="0" indent="0" algn="ctr" defTabSz="914400" rtl="0" eaLnBrk="1" fontAlgn="auto" latinLnBrk="0" hangingPunct="1">
-              <a:lnSpc>
-                <a:spcPct val="100000"/>
-              </a:lnSpc>
-              <a:spcBef>
-                <a:spcPts val="0"/>
-              </a:spcBef>
-              <a:spcAft>
-                <a:spcPts val="0"/>
-              </a:spcAft>
-              <a:buClrTx/>
-              <a:buSzTx/>
-              <a:buFontTx/>
-              <a:buNone/>
-              <a:tabLst/>
-              <a:defRPr/>
-            </a:pPr>
-            <a:endParaRPr kumimoji="0" lang="en-US" sz="1800" b="0" i="0" u="none" strike="noStrike" kern="1200" cap="none" spc="0" normalizeH="0" baseline="0" noProof="0">
-              <a:ln>
-                <a:noFill/>
-              </a:ln>
-              <a:solidFill>
-                <a:prstClr val="white"/>
-              </a:solidFill>
-              <a:effectLst/>
-              <a:uLnTx/>
-              <a:uFillTx/>
-              <a:latin typeface="Calibri" panose="020F0502020204030204"/>
-              <a:ea typeface="+mn-ea"/>
-              <a:cs typeface="+mn-cs"/>
-            </a:endParaRPr>
-          </a:p>
-        </p:txBody>
-      </p:sp>
-      <p:sp>
-        <p:nvSpPr>
-          <p:cNvPr id="3" name="Content Placeholder 2">
-            <a:extLst>
-              <a:ext uri="{FF2B5EF4-FFF2-40B4-BE49-F238E27FC236}">
-                <a16:creationId xmlns:a16="http://schemas.microsoft.com/office/drawing/2014/main" id="{A2EC288F-4A88-4641-9F49-11018BF8CF49}"/>
-              </a:ext>
-            </a:extLst>
-          </p:cNvPr>
-          <p:cNvSpPr>
-            <a:spLocks noGrp="1"/>
-          </p:cNvSpPr>
-          <p:nvPr>
-            <p:ph idx="1"/>
-          </p:nvPr>
-        </p:nvSpPr>
-        <p:spPr>
-          <a:xfrm>
-            <a:off x="8029319" y="917725"/>
-            <a:ext cx="3424739" cy="4852362"/>
-          </a:xfrm>
-        </p:spPr>
-        <p:txBody>
-          <a:bodyPr anchor="ctr">
-            <a:normAutofit/>
-          </a:bodyPr>
-          <a:lstStyle/>
-          <a:p>
-            <a:r>
-              <a:rPr lang="en-US" sz="2000">
-                <a:solidFill>
-                  <a:srgbClr val="FFFFFF"/>
-                </a:solidFill>
-              </a:rPr>
-              <a:t>Use less pressure on your pencil</a:t>
-            </a:r>
-          </a:p>
-          <a:p>
-            <a:r>
-              <a:rPr lang="en-US" sz="2000">
-                <a:solidFill>
-                  <a:srgbClr val="FFFFFF"/>
-                </a:solidFill>
-              </a:rPr>
-              <a:t>Having a pencil with a point will help produce high quality lettering that can be copied easily and clearly</a:t>
-            </a:r>
-          </a:p>
-          <a:p>
-            <a:r>
-              <a:rPr lang="en-US" sz="2000">
-                <a:solidFill>
-                  <a:srgbClr val="FFFFFF"/>
-                </a:solidFill>
-              </a:rPr>
-              <a:t>Have your forearm sully supported with your hand resting on its side</a:t>
-            </a:r>
-          </a:p>
-          <a:p>
-            <a:r>
-              <a:rPr lang="en-US" sz="2000">
-                <a:solidFill>
-                  <a:srgbClr val="FFFFFF"/>
-                </a:solidFill>
-              </a:rPr>
-              <a:t>Take your time and relax, pausing is most likely needed</a:t>
-            </a:r>
-          </a:p>
-          <a:p>
-            <a:r>
-              <a:rPr lang="en-US" sz="2000">
-                <a:solidFill>
-                  <a:srgbClr val="FFFFFF"/>
-                </a:solidFill>
-              </a:rPr>
-              <a:t>“Pull” the pencil across the page to not dig into the drawing</a:t>
-            </a:r>
-          </a:p>
-        </p:txBody>
-      </p:sp>
-    </p:spTree>
-    <p:extLst>
-      <p:ext uri="{BB962C8B-B14F-4D97-AF65-F5344CB8AC3E}">
-        <p14:creationId xmlns:p14="http://schemas.microsoft.com/office/powerpoint/2010/main" val="1401278197"/>
-      </p:ext>
-    </p:extLst>
-  </p:cSld>
-  <p:clrMapOvr>
-    <a:masterClrMapping/>
-  </p:clrMapOvr>
-  <mc:AlternateContent xmlns:mc="http://schemas.openxmlformats.org/markup-compatibility/2006" xmlns:p14="http://schemas.microsoft.com/office/powerpoint/2010/main">
-    <mc:Choice Requires="p14">
-      <p:transition spd="med" p14:dur="700">
-        <p:fade/>
-      </p:transition>
-    </mc:Choice>
-    <mc:Fallback xmlns="">
-      <p:transition spd="med">
-        <p:fade/>
-      </p:transition>
-    </mc:Fallback>
-  </mc:AlternateContent>
-</p:sld>
-</file>
-
-<file path=ppt/slides/slide6.xml><?xml version="1.0" encoding="utf-8"?>
-<p:sld xmlns:a="http://schemas.openxmlformats.org/drawingml/2006/main" xmlns:r="http://schemas.openxmlformats.org/officeDocument/2006/relationships" xmlns:p="http://schemas.openxmlformats.org/presentationml/2006/main">
-  <p:cSld>
-    <p:bg>
-      <p:bgPr>
-        <a:solidFill>
-          <a:schemeClr val="bg1">
-            <a:tint val="95000"/>
-            <a:satMod val="170000"/>
-          </a:schemeClr>
-        </a:solidFill>
-        <a:effectLst/>
-      </p:bgPr>
-    </p:bg>
-    <p:spTree>
-      <p:nvGrpSpPr>
-        <p:cNvPr id="1" name=""/>
-        <p:cNvGrpSpPr/>
-        <p:nvPr/>
-      </p:nvGrpSpPr>
-      <p:grpSpPr>
-        <a:xfrm>
-          <a:off x="0" y="0"/>
-          <a:ext cx="0" cy="0"/>
-          <a:chOff x="0" y="0"/>
-          <a:chExt cx="0" cy="0"/>
-        </a:xfrm>
-      </p:grpSpPr>
-      <p:sp>
-        <p:nvSpPr>
-          <p:cNvPr id="2" name="Title 1">
-            <a:extLst>
-              <a:ext uri="{FF2B5EF4-FFF2-40B4-BE49-F238E27FC236}">
-                <a16:creationId xmlns:a16="http://schemas.microsoft.com/office/drawing/2014/main" id="{26C2B765-1E7B-46EB-8F54-380E9853517C}"/>
-              </a:ext>
-            </a:extLst>
-          </p:cNvPr>
-          <p:cNvSpPr>
-            <a:spLocks noGrp="1"/>
-          </p:cNvSpPr>
-          <p:nvPr>
-            <p:ph type="title"/>
-          </p:nvPr>
-        </p:nvSpPr>
-        <p:spPr>
-          <a:xfrm>
-            <a:off x="1023257" y="965198"/>
-            <a:ext cx="6766078" cy="4927601"/>
-          </a:xfrm>
-        </p:spPr>
-        <p:txBody>
-          <a:bodyPr vert="horz" lIns="91440" tIns="45720" rIns="91440" bIns="45720" rtlCol="0" anchor="ctr">
-            <a:normAutofit/>
-          </a:bodyPr>
-          <a:lstStyle/>
-          <a:p>
-            <a:pPr algn="r"/>
-            <a:r>
-              <a:rPr lang="en-US" sz="6000" kern="1200">
-                <a:solidFill>
-                  <a:schemeClr val="tx1"/>
-                </a:solidFill>
-                <a:latin typeface="+mj-lt"/>
-                <a:ea typeface="+mj-ea"/>
-                <a:cs typeface="+mj-cs"/>
-              </a:rPr>
-              <a:t>Lettering Guide</a:t>
-            </a:r>
-          </a:p>
-        </p:txBody>
-      </p:sp>
-      <p:sp>
-        <p:nvSpPr>
-          <p:cNvPr id="16" name="Rectangle 15">
-            <a:extLst>
-              <a:ext uri="{FF2B5EF4-FFF2-40B4-BE49-F238E27FC236}">
-                <a16:creationId xmlns:a16="http://schemas.microsoft.com/office/drawing/2014/main" id="{793EF0C2-EE57-40DD-B754-BF1477FABABB}"/>
-              </a:ext>
-              <a:ext uri="{C183D7F6-B498-43B3-948B-1728B52AA6E4}">
-                <adec:decorative xmlns:adec="http://schemas.microsoft.com/office/drawing/2017/decorative" val="1"/>
-              </a:ext>
-            </a:extLst>
-          </p:cNvPr>
-          <p:cNvSpPr>
-            <a:spLocks noGrp="1" noRot="1" noChangeAspect="1" noMove="1" noResize="1" noEditPoints="1" noAdjustHandles="1" noChangeArrowheads="1" noChangeShapeType="1" noTextEdit="1"/>
-          </p:cNvSpPr>
-          <p:nvPr>
-            <p:extLst>
-              <p:ext uri="{386F3935-93C4-4BCD-93E2-E3B085C9AB24}">
-                <p16:designElem xmlns:p16="http://schemas.microsoft.com/office/powerpoint/2015/main" val="1"/>
-              </p:ext>
-            </p:extLst>
-          </p:nvPr>
-        </p:nvSpPr>
-        <p:spPr>
-          <a:xfrm>
-            <a:off x="8119870" y="0"/>
-            <a:ext cx="4072130" cy="6858000"/>
-          </a:xfrm>
-          <a:prstGeom prst="rect">
-            <a:avLst/>
-          </a:prstGeom>
-          <a:solidFill>
-            <a:schemeClr val="accent1">
-              <a:alpha val="80000"/>
-            </a:schemeClr>
-          </a:solidFill>
-          <a:ln>
-            <a:noFill/>
-          </a:ln>
-        </p:spPr>
-        <p:style>
-          <a:lnRef idx="2">
-            <a:schemeClr val="accent1">
-              <a:shade val="50000"/>
-            </a:schemeClr>
-          </a:lnRef>
-          <a:fillRef idx="1">
-            <a:schemeClr val="accent1"/>
-          </a:fillRef>
-          <a:effectRef idx="0">
-            <a:schemeClr val="accent1"/>
-          </a:effectRef>
-          <a:fontRef idx="minor">
-            <a:schemeClr val="lt1"/>
-          </a:fontRef>
-        </p:style>
-        <p:txBody>
-          <a:bodyPr rtlCol="0" anchor="ctr"/>
-          <a:lstStyle/>
-          <a:p>
-            <a:pPr algn="ctr"/>
-            <a:endParaRPr lang="en-US"/>
-          </a:p>
-        </p:txBody>
-      </p:sp>
-      <p:sp>
-        <p:nvSpPr>
-          <p:cNvPr id="3" name="Content Placeholder 2">
-            <a:extLst>
-              <a:ext uri="{FF2B5EF4-FFF2-40B4-BE49-F238E27FC236}">
-                <a16:creationId xmlns:a16="http://schemas.microsoft.com/office/drawing/2014/main" id="{3C5BBD25-9076-4AEC-B1A1-556551C0FD64}"/>
-              </a:ext>
-            </a:extLst>
-          </p:cNvPr>
-          <p:cNvSpPr>
-            <a:spLocks noGrp="1"/>
-          </p:cNvSpPr>
-          <p:nvPr>
-            <p:ph idx="1"/>
-          </p:nvPr>
-        </p:nvSpPr>
-        <p:spPr>
-          <a:xfrm>
-            <a:off x="8454570" y="965199"/>
-            <a:ext cx="3093963" cy="4927602"/>
-          </a:xfrm>
-        </p:spPr>
-        <p:txBody>
-          <a:bodyPr vert="horz" lIns="91440" tIns="45720" rIns="91440" bIns="45720" rtlCol="0" anchor="ctr">
-            <a:normAutofit/>
-          </a:bodyPr>
-          <a:lstStyle/>
-          <a:p>
-            <a:pPr marL="0" indent="0">
-              <a:buNone/>
-            </a:pPr>
-            <a:r>
-              <a:rPr lang="en-US" sz="2000" kern="1200">
-                <a:solidFill>
-                  <a:srgbClr val="FFFFFF"/>
-                </a:solidFill>
-                <a:latin typeface="+mn-lt"/>
-                <a:ea typeface="+mn-ea"/>
-                <a:cs typeface="+mn-cs"/>
-              </a:rPr>
-              <a:t>The Ames Lettering Guide can help provide guidelines for freehand technical drawing</a:t>
-            </a:r>
-          </a:p>
-        </p:txBody>
-      </p:sp>
-      <p:sp>
-        <p:nvSpPr>
-          <p:cNvPr id="4" name="Footer Placeholder 3">
-            <a:extLst>
-              <a:ext uri="{FF2B5EF4-FFF2-40B4-BE49-F238E27FC236}">
-                <a16:creationId xmlns:a16="http://schemas.microsoft.com/office/drawing/2014/main" id="{9279740F-8AF1-4320-9AD2-4BFF935C2549}"/>
-              </a:ext>
-            </a:extLst>
-          </p:cNvPr>
-          <p:cNvSpPr>
-            <a:spLocks noGrp="1"/>
-          </p:cNvSpPr>
-          <p:nvPr>
-            <p:ph type="ftr" sz="quarter" idx="11"/>
-          </p:nvPr>
-        </p:nvSpPr>
-        <p:spPr>
-          <a:xfrm>
-            <a:off x="1023257" y="6356350"/>
-            <a:ext cx="4114800" cy="365125"/>
-          </a:xfrm>
-        </p:spPr>
-        <p:txBody>
-          <a:bodyPr vert="horz" lIns="91440" tIns="45720" rIns="91440" bIns="45720" rtlCol="0" anchor="ctr">
-            <a:normAutofit/>
-          </a:bodyPr>
-          <a:lstStyle/>
-          <a:p>
-            <a:pPr algn="l" defTabSz="914400">
-              <a:spcAft>
-                <a:spcPts val="600"/>
-              </a:spcAft>
-            </a:pPr>
-            <a:r>
-              <a:rPr lang="en-US" sz="1100" kern="1200">
-                <a:solidFill>
-                  <a:schemeClr val="tx1">
-                    <a:tint val="75000"/>
-                  </a:schemeClr>
-                </a:solidFill>
-                <a:latin typeface="+mn-lt"/>
-                <a:ea typeface="+mn-ea"/>
-                <a:cs typeface="+mn-cs"/>
-              </a:rPr>
-              <a:t>Add a footer</a:t>
-            </a:r>
-          </a:p>
-        </p:txBody>
-      </p:sp>
-    </p:spTree>
-    <p:extLst>
-      <p:ext uri="{BB962C8B-B14F-4D97-AF65-F5344CB8AC3E}">
-        <p14:creationId xmlns:p14="http://schemas.microsoft.com/office/powerpoint/2010/main" val="1317013365"/>
-      </p:ext>
-    </p:extLst>
-  </p:cSld>
-  <p:clrMapOvr>
-    <a:overrideClrMapping bg1="dk1" tx1="lt1" bg2="dk2" tx2="lt2" accent1="accent1" accent2="accent2" accent3="accent3" accent4="accent4" accent5="accent5" accent6="accent6" hlink="hlink" folHlink="folHlink"/>
-  </p:clrMapOvr>
-  <mc:AlternateContent xmlns:mc="http://schemas.openxmlformats.org/markup-compatibility/2006" xmlns:p14="http://schemas.microsoft.com/office/powerpoint/2010/main">
-    <mc:Choice Requires="p14">
-      <p:transition spd="med" p14:dur="700">
-        <p:fade/>
-      </p:transition>
-    </mc:Choice>
-    <mc:Fallback xmlns="">
-      <p:transition spd="med">
-        <p:fade/>
-      </p:transition>
-    </mc:Fallback>
-  </mc:AlternateContent>
-</p:sld>
-</file>
-
-<file path=ppt/slides/slide7.xml><?xml version="1.0" encoding="utf-8"?>
+<file path=ppt/slides/slide12.xml><?xml version="1.0" encoding="utf-8"?>
 <p:sld xmlns:a="http://schemas.openxmlformats.org/drawingml/2006/main" xmlns:r="http://schemas.openxmlformats.org/officeDocument/2006/relationships" xmlns:p="http://schemas.openxmlformats.org/presentationml/2006/main">
   <p:cSld>
     <p:bg>
@@ -5773,7 +4870,7 @@
     </p:spTree>
     <p:extLst>
       <p:ext uri="{BB962C8B-B14F-4D97-AF65-F5344CB8AC3E}">
-        <p14:creationId xmlns:p14="http://schemas.microsoft.com/office/powerpoint/2010/main" val="1012076388"/>
+        <p14:creationId xmlns:p14="http://schemas.microsoft.com/office/powerpoint/2010/main" val="4081742865"/>
       </p:ext>
     </p:extLst>
   </p:cSld>
@@ -5795,7 +4892,7 @@
 </p:sld>
 </file>
 
-<file path=ppt/slides/slide8.xml><?xml version="1.0" encoding="utf-8"?>
+<file path=ppt/slides/slide13.xml><?xml version="1.0" encoding="utf-8"?>
 <p:sld xmlns:a="http://schemas.openxmlformats.org/drawingml/2006/main" xmlns:r="http://schemas.openxmlformats.org/officeDocument/2006/relationships" xmlns:p="http://schemas.openxmlformats.org/presentationml/2006/main">
   <p:cSld>
     <p:bg>
@@ -6256,6 +5353,2336 @@
           <a:lstStyle/>
           <a:p>
             <a:r>
+              <a:rPr lang="en-US" sz="1800" dirty="0"/>
+              <a:t>Using the lettering guide to create your title blocks</a:t>
+            </a:r>
+          </a:p>
+          <a:p>
+            <a:r>
+              <a:rPr lang="en-US" sz="1800" dirty="0"/>
+              <a:t>3/8” vertical capitals</a:t>
+            </a:r>
+          </a:p>
+          <a:p>
+            <a:r>
+              <a:rPr lang="en-US" sz="1800" dirty="0"/>
+              <a:t>1/8” vertical capitals</a:t>
+            </a:r>
+          </a:p>
+          <a:p>
+            <a:r>
+              <a:rPr lang="en-US" sz="1800" dirty="0"/>
+              <a:t>1/8” vertical lower case</a:t>
+            </a:r>
+          </a:p>
+          <a:p>
+            <a:endParaRPr lang="en-US" sz="1800" dirty="0"/>
+          </a:p>
+          <a:p>
+            <a:pPr marL="0" indent="0" algn="ctr">
+              <a:buNone/>
+            </a:pPr>
+            <a:r>
+              <a:rPr lang="en-US" sz="3200" b="1" dirty="0"/>
+              <a:t>DUE TUESDAY OCTOBER 9TH</a:t>
+            </a:r>
+          </a:p>
+        </p:txBody>
+      </p:sp>
+      <p:sp>
+        <p:nvSpPr>
+          <p:cNvPr id="4" name="Footer Placeholder 3">
+            <a:extLst>
+              <a:ext uri="{FF2B5EF4-FFF2-40B4-BE49-F238E27FC236}">
+                <a16:creationId xmlns:a16="http://schemas.microsoft.com/office/drawing/2014/main" id="{5F183A92-70E0-4BB3-A9A6-D12A58EBE610}"/>
+              </a:ext>
+            </a:extLst>
+          </p:cNvPr>
+          <p:cNvSpPr>
+            <a:spLocks noGrp="1"/>
+          </p:cNvSpPr>
+          <p:nvPr>
+            <p:ph type="ftr" sz="quarter" idx="11"/>
+          </p:nvPr>
+        </p:nvSpPr>
+        <p:spPr>
+          <a:xfrm>
+            <a:off x="6657173" y="6199632"/>
+            <a:ext cx="5006336" cy="365125"/>
+          </a:xfrm>
+        </p:spPr>
+        <p:txBody>
+          <a:bodyPr>
+            <a:normAutofit/>
+          </a:bodyPr>
+          <a:lstStyle/>
+          <a:p>
+            <a:pPr algn="l">
+              <a:spcAft>
+                <a:spcPts val="600"/>
+              </a:spcAft>
+            </a:pPr>
+            <a:r>
+              <a:rPr lang="en-US" sz="1100">
+                <a:solidFill>
+                  <a:schemeClr val="tx1">
+                    <a:alpha val="80000"/>
+                  </a:schemeClr>
+                </a:solidFill>
+              </a:rPr>
+              <a:t>Add a footer</a:t>
+            </a:r>
+          </a:p>
+        </p:txBody>
+      </p:sp>
+    </p:spTree>
+    <p:extLst>
+      <p:ext uri="{BB962C8B-B14F-4D97-AF65-F5344CB8AC3E}">
+        <p14:creationId xmlns:p14="http://schemas.microsoft.com/office/powerpoint/2010/main" val="2675330675"/>
+      </p:ext>
+    </p:extLst>
+  </p:cSld>
+  <p:clrMapOvr>
+    <a:overrideClrMapping bg1="dk1" tx1="lt1" bg2="dk2" tx2="lt2" accent1="accent1" accent2="accent2" accent3="accent3" accent4="accent4" accent5="accent5" accent6="accent6" hlink="hlink" folHlink="folHlink"/>
+  </p:clrMapOvr>
+  <mc:AlternateContent xmlns:mc="http://schemas.openxmlformats.org/markup-compatibility/2006" xmlns:p14="http://schemas.microsoft.com/office/powerpoint/2010/main">
+    <mc:Choice Requires="p14">
+      <p:transition spd="med" p14:dur="700">
+        <p:fade/>
+      </p:transition>
+    </mc:Choice>
+    <mc:Fallback xmlns="">
+      <p:transition spd="med">
+        <p:fade/>
+      </p:transition>
+    </mc:Fallback>
+  </mc:AlternateContent>
+</p:sld>
+</file>
+
+<file path=ppt/slides/slide2.xml><?xml version="1.0" encoding="utf-8"?>
+<p:sld xmlns:a="http://schemas.openxmlformats.org/drawingml/2006/main" xmlns:r="http://schemas.openxmlformats.org/officeDocument/2006/relationships" xmlns:p="http://schemas.openxmlformats.org/presentationml/2006/main">
+  <p:cSld>
+    <p:bg>
+      <p:bgPr>
+        <a:solidFill>
+          <a:schemeClr val="bg1"/>
+        </a:solidFill>
+        <a:effectLst/>
+      </p:bgPr>
+    </p:bg>
+    <p:spTree>
+      <p:nvGrpSpPr>
+        <p:cNvPr id="1" name=""/>
+        <p:cNvGrpSpPr/>
+        <p:nvPr/>
+      </p:nvGrpSpPr>
+      <p:grpSpPr>
+        <a:xfrm>
+          <a:off x="0" y="0"/>
+          <a:ext cx="0" cy="0"/>
+          <a:chOff x="0" y="0"/>
+          <a:chExt cx="0" cy="0"/>
+        </a:xfrm>
+      </p:grpSpPr>
+      <p:sp>
+        <p:nvSpPr>
+          <p:cNvPr id="9" name="Rectangle 8">
+            <a:extLst>
+              <a:ext uri="{FF2B5EF4-FFF2-40B4-BE49-F238E27FC236}">
+                <a16:creationId xmlns:a16="http://schemas.microsoft.com/office/drawing/2014/main" id="{6F9EB9F2-07E2-4D64-BBD8-BB5B217F1218}"/>
+              </a:ext>
+              <a:ext uri="{C183D7F6-B498-43B3-948B-1728B52AA6E4}">
+                <adec:decorative xmlns:adec="http://schemas.microsoft.com/office/drawing/2017/decorative" val="1"/>
+              </a:ext>
+            </a:extLst>
+          </p:cNvPr>
+          <p:cNvSpPr>
+            <a:spLocks noGrp="1" noRot="1" noChangeAspect="1" noMove="1" noResize="1" noEditPoints="1" noAdjustHandles="1" noChangeArrowheads="1" noChangeShapeType="1" noTextEdit="1"/>
+          </p:cNvSpPr>
+          <p:nvPr>
+            <p:extLst>
+              <p:ext uri="{386F3935-93C4-4BCD-93E2-E3B085C9AB24}">
+                <p16:designElem xmlns:p16="http://schemas.microsoft.com/office/powerpoint/2015/main" val="1"/>
+              </p:ext>
+            </p:extLst>
+          </p:nvPr>
+        </p:nvSpPr>
+        <p:spPr bwMode="ltGray">
+          <a:xfrm>
+            <a:off x="321564" y="320040"/>
+            <a:ext cx="11548872" cy="6217920"/>
+          </a:xfrm>
+          <a:prstGeom prst="rect">
+            <a:avLst/>
+          </a:prstGeom>
+          <a:solidFill>
+            <a:schemeClr val="tx1">
+              <a:alpha val="12000"/>
+            </a:schemeClr>
+          </a:solidFill>
+          <a:ln w="127000" cap="sq" cmpd="thinThick">
+            <a:noFill/>
+          </a:ln>
+        </p:spPr>
+        <p:style>
+          <a:lnRef idx="2">
+            <a:schemeClr val="accent1">
+              <a:shade val="50000"/>
+            </a:schemeClr>
+          </a:lnRef>
+          <a:fillRef idx="1">
+            <a:schemeClr val="accent1"/>
+          </a:fillRef>
+          <a:effectRef idx="0">
+            <a:schemeClr val="accent1"/>
+          </a:effectRef>
+          <a:fontRef idx="minor">
+            <a:schemeClr val="lt1"/>
+          </a:fontRef>
+        </p:style>
+        <p:txBody>
+          <a:bodyPr rtlCol="0" anchor="ctr"/>
+          <a:lstStyle/>
+          <a:p>
+            <a:pPr algn="ctr"/>
+            <a:endParaRPr lang="en-US"/>
+          </a:p>
+        </p:txBody>
+      </p:sp>
+      <p:sp>
+        <p:nvSpPr>
+          <p:cNvPr id="2" name="Title 1"/>
+          <p:cNvSpPr>
+            <a:spLocks noGrp="1"/>
+          </p:cNvSpPr>
+          <p:nvPr>
+            <p:ph type="title"/>
+          </p:nvPr>
+        </p:nvSpPr>
+        <p:spPr>
+          <a:xfrm>
+            <a:off x="4380588" y="965199"/>
+            <a:ext cx="6766078" cy="4927601"/>
+          </a:xfrm>
+        </p:spPr>
+        <p:txBody>
+          <a:bodyPr vert="horz" lIns="91440" tIns="45720" rIns="91440" bIns="45720" rtlCol="0" anchor="ctr">
+            <a:normAutofit/>
+          </a:bodyPr>
+          <a:lstStyle/>
+          <a:p>
+            <a:r>
+              <a:rPr lang="en-US" sz="5400" kern="1200">
+                <a:solidFill>
+                  <a:schemeClr val="tx1">
+                    <a:lumMod val="85000"/>
+                    <a:lumOff val="15000"/>
+                  </a:schemeClr>
+                </a:solidFill>
+                <a:latin typeface="+mj-lt"/>
+                <a:ea typeface="+mj-ea"/>
+                <a:cs typeface="+mj-cs"/>
+              </a:rPr>
+              <a:t>Google classroom code</a:t>
+            </a:r>
+          </a:p>
+        </p:txBody>
+      </p:sp>
+      <p:sp>
+        <p:nvSpPr>
+          <p:cNvPr id="3" name="Content Placeholder 2"/>
+          <p:cNvSpPr>
+            <a:spLocks noGrp="1"/>
+          </p:cNvSpPr>
+          <p:nvPr>
+            <p:ph idx="1"/>
+          </p:nvPr>
+        </p:nvSpPr>
+        <p:spPr>
+          <a:xfrm>
+            <a:off x="1023257" y="965198"/>
+            <a:ext cx="2707937" cy="4927602"/>
+          </a:xfrm>
+        </p:spPr>
+        <p:txBody>
+          <a:bodyPr vert="horz" lIns="91440" tIns="45720" rIns="91440" bIns="45720" rtlCol="0" anchor="ctr">
+            <a:normAutofit/>
+          </a:bodyPr>
+          <a:lstStyle/>
+          <a:p>
+            <a:pPr marL="0" indent="0" algn="r">
+              <a:buNone/>
+            </a:pPr>
+            <a:r>
+              <a:rPr lang="en-US" sz="2000" b="1" kern="1200">
+                <a:solidFill>
+                  <a:schemeClr val="accent1"/>
+                </a:solidFill>
+                <a:latin typeface="+mn-lt"/>
+                <a:ea typeface="+mn-ea"/>
+                <a:cs typeface="+mn-cs"/>
+              </a:rPr>
+              <a:t>okia9n</a:t>
+            </a:r>
+          </a:p>
+        </p:txBody>
+      </p:sp>
+      <p:cxnSp>
+        <p:nvCxnSpPr>
+          <p:cNvPr id="11" name="Straight Connector 10">
+            <a:extLst>
+              <a:ext uri="{FF2B5EF4-FFF2-40B4-BE49-F238E27FC236}">
+                <a16:creationId xmlns:a16="http://schemas.microsoft.com/office/drawing/2014/main" id="{F0C57C7C-DFE9-4A1E-B7A9-DF40E63366BB}"/>
+              </a:ext>
+              <a:ext uri="{C183D7F6-B498-43B3-948B-1728B52AA6E4}">
+                <adec:decorative xmlns:adec="http://schemas.microsoft.com/office/drawing/2017/decorative" val="1"/>
+              </a:ext>
+            </a:extLst>
+          </p:cNvPr>
+          <p:cNvCxnSpPr>
+            <a:cxnSpLocks noGrp="1" noRot="1" noChangeAspect="1" noMove="1" noResize="1" noEditPoints="1" noAdjustHandles="1" noChangeArrowheads="1" noChangeShapeType="1"/>
+          </p:cNvCxnSpPr>
+          <p:nvPr>
+            <p:extLst>
+              <p:ext uri="{386F3935-93C4-4BCD-93E2-E3B085C9AB24}">
+                <p16:designElem xmlns:p16="http://schemas.microsoft.com/office/powerpoint/2015/main" val="1"/>
+              </p:ext>
+            </p:extLst>
+          </p:nvPr>
+        </p:nvCxnSpPr>
+        <p:spPr>
+          <a:xfrm>
+            <a:off x="4055891" y="2057399"/>
+            <a:ext cx="0" cy="2743200"/>
+          </a:xfrm>
+          <a:prstGeom prst="line">
+            <a:avLst/>
+          </a:prstGeom>
+          <a:ln w="19050">
+            <a:solidFill>
+              <a:schemeClr val="tx1">
+                <a:lumMod val="85000"/>
+                <a:lumOff val="15000"/>
+              </a:schemeClr>
+            </a:solidFill>
+          </a:ln>
+        </p:spPr>
+        <p:style>
+          <a:lnRef idx="1">
+            <a:schemeClr val="accent1"/>
+          </a:lnRef>
+          <a:fillRef idx="0">
+            <a:schemeClr val="accent1"/>
+          </a:fillRef>
+          <a:effectRef idx="0">
+            <a:schemeClr val="accent1"/>
+          </a:effectRef>
+          <a:fontRef idx="minor">
+            <a:schemeClr val="tx1"/>
+          </a:fontRef>
+        </p:style>
+      </p:cxnSp>
+      <p:sp>
+        <p:nvSpPr>
+          <p:cNvPr id="4" name="Footer Placeholder 3">
+            <a:extLst>
+              <a:ext uri="{FF2B5EF4-FFF2-40B4-BE49-F238E27FC236}">
+                <a16:creationId xmlns:a16="http://schemas.microsoft.com/office/drawing/2014/main" id="{EADFB87E-2A3F-4815-8F5E-3CF3521EBF24}"/>
+              </a:ext>
+            </a:extLst>
+          </p:cNvPr>
+          <p:cNvSpPr>
+            <a:spLocks noGrp="1"/>
+          </p:cNvSpPr>
+          <p:nvPr>
+            <p:ph type="ftr" sz="quarter" idx="11"/>
+          </p:nvPr>
+        </p:nvSpPr>
+        <p:spPr>
+          <a:xfrm>
+            <a:off x="4380588" y="6553690"/>
+            <a:ext cx="5053698" cy="274320"/>
+          </a:xfrm>
+        </p:spPr>
+        <p:txBody>
+          <a:bodyPr vert="horz" lIns="91440" tIns="45720" rIns="91440" bIns="45720" rtlCol="0" anchor="ctr">
+            <a:normAutofit/>
+          </a:bodyPr>
+          <a:lstStyle/>
+          <a:p>
+            <a:pPr algn="l" defTabSz="914400">
+              <a:spcAft>
+                <a:spcPts val="600"/>
+              </a:spcAft>
+            </a:pPr>
+            <a:r>
+              <a:rPr lang="en-US" sz="1050" kern="1200">
+                <a:solidFill>
+                  <a:schemeClr val="tx1">
+                    <a:tint val="75000"/>
+                  </a:schemeClr>
+                </a:solidFill>
+                <a:latin typeface="+mn-lt"/>
+                <a:ea typeface="+mn-ea"/>
+                <a:cs typeface="+mn-cs"/>
+              </a:rPr>
+              <a:t>Unit 1 – Section 1 - Day 1</a:t>
+            </a:r>
+          </a:p>
+        </p:txBody>
+      </p:sp>
+    </p:spTree>
+    <p:extLst>
+      <p:ext uri="{BB962C8B-B14F-4D97-AF65-F5344CB8AC3E}">
+        <p14:creationId xmlns:p14="http://schemas.microsoft.com/office/powerpoint/2010/main" val="1645033752"/>
+      </p:ext>
+    </p:extLst>
+  </p:cSld>
+  <p:clrMapOvr>
+    <a:masterClrMapping/>
+  </p:clrMapOvr>
+  <mc:AlternateContent xmlns:mc="http://schemas.openxmlformats.org/markup-compatibility/2006" xmlns:p14="http://schemas.microsoft.com/office/powerpoint/2010/main">
+    <mc:Choice Requires="p14">
+      <p:transition spd="med" p14:dur="700">
+        <p:fade/>
+      </p:transition>
+    </mc:Choice>
+    <mc:Fallback xmlns="">
+      <p:transition spd="med">
+        <p:fade/>
+      </p:transition>
+    </mc:Fallback>
+  </mc:AlternateContent>
+</p:sld>
+</file>
+
+<file path=ppt/slides/slide3.xml><?xml version="1.0" encoding="utf-8"?>
+<p:sld xmlns:a="http://schemas.openxmlformats.org/drawingml/2006/main" xmlns:r="http://schemas.openxmlformats.org/officeDocument/2006/relationships" xmlns:p="http://schemas.openxmlformats.org/presentationml/2006/main">
+  <p:cSld>
+    <p:bg>
+      <p:bgPr>
+        <a:solidFill>
+          <a:schemeClr val="bg1"/>
+        </a:solidFill>
+        <a:effectLst/>
+      </p:bgPr>
+    </p:bg>
+    <p:spTree>
+      <p:nvGrpSpPr>
+        <p:cNvPr id="1" name=""/>
+        <p:cNvGrpSpPr/>
+        <p:nvPr/>
+      </p:nvGrpSpPr>
+      <p:grpSpPr>
+        <a:xfrm>
+          <a:off x="0" y="0"/>
+          <a:ext cx="0" cy="0"/>
+          <a:chOff x="0" y="0"/>
+          <a:chExt cx="0" cy="0"/>
+        </a:xfrm>
+      </p:grpSpPr>
+      <p:sp>
+        <p:nvSpPr>
+          <p:cNvPr id="9" name="Rectangle 8">
+            <a:extLst>
+              <a:ext uri="{FF2B5EF4-FFF2-40B4-BE49-F238E27FC236}">
+                <a16:creationId xmlns:a16="http://schemas.microsoft.com/office/drawing/2014/main" id="{8D70B121-56F4-4848-B38B-182089D909FA}"/>
+              </a:ext>
+              <a:ext uri="{C183D7F6-B498-43B3-948B-1728B52AA6E4}">
+                <adec:decorative xmlns:adec="http://schemas.microsoft.com/office/drawing/2017/decorative" val="1"/>
+              </a:ext>
+            </a:extLst>
+          </p:cNvPr>
+          <p:cNvSpPr>
+            <a:spLocks noGrp="1" noRot="1" noChangeAspect="1" noMove="1" noResize="1" noEditPoints="1" noAdjustHandles="1" noChangeArrowheads="1" noChangeShapeType="1" noTextEdit="1"/>
+          </p:cNvSpPr>
+          <p:nvPr>
+            <p:extLst>
+              <p:ext uri="{386F3935-93C4-4BCD-93E2-E3B085C9AB24}">
+                <p16:designElem xmlns:p16="http://schemas.microsoft.com/office/powerpoint/2015/main" val="1"/>
+              </p:ext>
+            </p:extLst>
+          </p:nvPr>
+        </p:nvSpPr>
+        <p:spPr bwMode="ltGray">
+          <a:xfrm>
+            <a:off x="321564" y="320040"/>
+            <a:ext cx="11548872" cy="6217920"/>
+          </a:xfrm>
+          <a:prstGeom prst="rect">
+            <a:avLst/>
+          </a:prstGeom>
+          <a:solidFill>
+            <a:schemeClr val="tx1">
+              <a:alpha val="8000"/>
+            </a:schemeClr>
+          </a:solidFill>
+          <a:ln w="127000" cap="sq" cmpd="thinThick">
+            <a:noFill/>
+          </a:ln>
+        </p:spPr>
+        <p:style>
+          <a:lnRef idx="2">
+            <a:schemeClr val="accent1">
+              <a:shade val="50000"/>
+            </a:schemeClr>
+          </a:lnRef>
+          <a:fillRef idx="1">
+            <a:schemeClr val="accent1"/>
+          </a:fillRef>
+          <a:effectRef idx="0">
+            <a:schemeClr val="accent1"/>
+          </a:effectRef>
+          <a:fontRef idx="minor">
+            <a:schemeClr val="lt1"/>
+          </a:fontRef>
+        </p:style>
+        <p:txBody>
+          <a:bodyPr rtlCol="0" anchor="ctr"/>
+          <a:lstStyle/>
+          <a:p>
+            <a:pPr algn="ctr"/>
+            <a:endParaRPr lang="en-US"/>
+          </a:p>
+        </p:txBody>
+      </p:sp>
+      <p:sp>
+        <p:nvSpPr>
+          <p:cNvPr id="2" name="Title 1"/>
+          <p:cNvSpPr>
+            <a:spLocks noGrp="1"/>
+          </p:cNvSpPr>
+          <p:nvPr>
+            <p:ph type="title"/>
+          </p:nvPr>
+        </p:nvSpPr>
+        <p:spPr>
+          <a:xfrm>
+            <a:off x="838200" y="963877"/>
+            <a:ext cx="3494362" cy="4930246"/>
+          </a:xfrm>
+        </p:spPr>
+        <p:txBody>
+          <a:bodyPr>
+            <a:normAutofit/>
+          </a:bodyPr>
+          <a:lstStyle/>
+          <a:p>
+            <a:pPr algn="r"/>
+            <a:r>
+              <a:rPr lang="en-US">
+                <a:solidFill>
+                  <a:schemeClr val="accent1"/>
+                </a:solidFill>
+              </a:rPr>
+              <a:t>The big idea</a:t>
+            </a:r>
+          </a:p>
+        </p:txBody>
+      </p:sp>
+      <p:cxnSp>
+        <p:nvCxnSpPr>
+          <p:cNvPr id="11" name="Straight Connector 10">
+            <a:extLst>
+              <a:ext uri="{FF2B5EF4-FFF2-40B4-BE49-F238E27FC236}">
+                <a16:creationId xmlns:a16="http://schemas.microsoft.com/office/drawing/2014/main" id="{2D72A2C9-F3CA-4216-8BAD-FA4C970C3C4E}"/>
+              </a:ext>
+              <a:ext uri="{C183D7F6-B498-43B3-948B-1728B52AA6E4}">
+                <adec:decorative xmlns:adec="http://schemas.microsoft.com/office/drawing/2017/decorative" val="1"/>
+              </a:ext>
+            </a:extLst>
+          </p:cNvPr>
+          <p:cNvCxnSpPr>
+            <a:cxnSpLocks noGrp="1" noRot="1" noChangeAspect="1" noMove="1" noResize="1" noEditPoints="1" noAdjustHandles="1" noChangeArrowheads="1" noChangeShapeType="1"/>
+          </p:cNvCxnSpPr>
+          <p:nvPr>
+            <p:extLst>
+              <p:ext uri="{386F3935-93C4-4BCD-93E2-E3B085C9AB24}">
+                <p16:designElem xmlns:p16="http://schemas.microsoft.com/office/powerpoint/2015/main" val="1"/>
+              </p:ext>
+            </p:extLst>
+          </p:nvPr>
+        </p:nvCxnSpPr>
+        <p:spPr>
+          <a:xfrm>
+            <a:off x="4654296" y="2057400"/>
+            <a:ext cx="0" cy="2743200"/>
+          </a:xfrm>
+          <a:prstGeom prst="line">
+            <a:avLst/>
+          </a:prstGeom>
+          <a:ln w="19050">
+            <a:solidFill>
+              <a:schemeClr val="tx1">
+                <a:lumMod val="85000"/>
+                <a:lumOff val="15000"/>
+              </a:schemeClr>
+            </a:solidFill>
+          </a:ln>
+        </p:spPr>
+        <p:style>
+          <a:lnRef idx="1">
+            <a:schemeClr val="accent1"/>
+          </a:lnRef>
+          <a:fillRef idx="0">
+            <a:schemeClr val="accent1"/>
+          </a:fillRef>
+          <a:effectRef idx="0">
+            <a:schemeClr val="accent1"/>
+          </a:effectRef>
+          <a:fontRef idx="minor">
+            <a:schemeClr val="tx1"/>
+          </a:fontRef>
+        </p:style>
+      </p:cxnSp>
+      <p:sp>
+        <p:nvSpPr>
+          <p:cNvPr id="3" name="Content Placeholder 2"/>
+          <p:cNvSpPr>
+            <a:spLocks noGrp="1"/>
+          </p:cNvSpPr>
+          <p:nvPr>
+            <p:ph idx="1"/>
+          </p:nvPr>
+        </p:nvSpPr>
+        <p:spPr>
+          <a:xfrm>
+            <a:off x="4976031" y="963877"/>
+            <a:ext cx="6377769" cy="4930246"/>
+          </a:xfrm>
+        </p:spPr>
+        <p:txBody>
+          <a:bodyPr anchor="ctr">
+            <a:normAutofit/>
+          </a:bodyPr>
+          <a:lstStyle/>
+          <a:p>
+            <a:r>
+              <a:rPr lang="en-US" sz="2400">
+                <a:cs typeface="Arial" pitchFamily="34" charset="0"/>
+              </a:rPr>
+              <a:t>There are different styles of lettering and industry standards</a:t>
+            </a:r>
+          </a:p>
+          <a:p>
+            <a:r>
+              <a:rPr lang="en-US" sz="2400">
+                <a:cs typeface="Arial" pitchFamily="34" charset="0"/>
+              </a:rPr>
+              <a:t>Guidelines are used for height and slope of letters</a:t>
+            </a:r>
+          </a:p>
+          <a:p>
+            <a:r>
+              <a:rPr lang="en-US" sz="2400">
+                <a:cs typeface="Arial" pitchFamily="34" charset="0"/>
+              </a:rPr>
+              <a:t>Single-stroke Gothic letters are commonly used in industry</a:t>
+            </a:r>
+          </a:p>
+        </p:txBody>
+      </p:sp>
+      <p:sp>
+        <p:nvSpPr>
+          <p:cNvPr id="4" name="Footer Placeholder 3">
+            <a:extLst>
+              <a:ext uri="{FF2B5EF4-FFF2-40B4-BE49-F238E27FC236}">
+                <a16:creationId xmlns:a16="http://schemas.microsoft.com/office/drawing/2014/main" id="{EADFB87E-2A3F-4815-8F5E-3CF3521EBF24}"/>
+              </a:ext>
+            </a:extLst>
+          </p:cNvPr>
+          <p:cNvSpPr>
+            <a:spLocks noGrp="1"/>
+          </p:cNvSpPr>
+          <p:nvPr>
+            <p:ph type="ftr" sz="quarter" idx="11"/>
+          </p:nvPr>
+        </p:nvSpPr>
+        <p:spPr>
+          <a:xfrm>
+            <a:off x="4976031" y="6033479"/>
+            <a:ext cx="5259985" cy="365125"/>
+          </a:xfrm>
+        </p:spPr>
+        <p:txBody>
+          <a:bodyPr>
+            <a:normAutofit/>
+          </a:bodyPr>
+          <a:lstStyle/>
+          <a:p>
+            <a:pPr algn="l">
+              <a:spcAft>
+                <a:spcPts val="600"/>
+              </a:spcAft>
+            </a:pPr>
+            <a:r>
+              <a:rPr lang="en-US" sz="1050">
+                <a:solidFill>
+                  <a:schemeClr val="tx1">
+                    <a:alpha val="80000"/>
+                  </a:schemeClr>
+                </a:solidFill>
+              </a:rPr>
+              <a:t>Unit 1 – Section 1 - Day 1</a:t>
+            </a:r>
+          </a:p>
+        </p:txBody>
+      </p:sp>
+    </p:spTree>
+    <p:extLst>
+      <p:ext uri="{BB962C8B-B14F-4D97-AF65-F5344CB8AC3E}">
+        <p14:creationId xmlns:p14="http://schemas.microsoft.com/office/powerpoint/2010/main" val="78530218"/>
+      </p:ext>
+    </p:extLst>
+  </p:cSld>
+  <p:clrMapOvr>
+    <a:masterClrMapping/>
+  </p:clrMapOvr>
+  <mc:AlternateContent xmlns:mc="http://schemas.openxmlformats.org/markup-compatibility/2006" xmlns:p14="http://schemas.microsoft.com/office/powerpoint/2010/main">
+    <mc:Choice Requires="p14">
+      <p:transition spd="med" p14:dur="700">
+        <p:fade/>
+      </p:transition>
+    </mc:Choice>
+    <mc:Fallback xmlns="">
+      <p:transition spd="med">
+        <p:fade/>
+      </p:transition>
+    </mc:Fallback>
+  </mc:AlternateContent>
+</p:sld>
+</file>
+
+<file path=ppt/slides/slide4.xml><?xml version="1.0" encoding="utf-8"?>
+<p:sld xmlns:a="http://schemas.openxmlformats.org/drawingml/2006/main" xmlns:r="http://schemas.openxmlformats.org/officeDocument/2006/relationships" xmlns:p="http://schemas.openxmlformats.org/presentationml/2006/main">
+  <p:cSld>
+    <p:bg>
+      <p:bgPr>
+        <a:solidFill>
+          <a:schemeClr val="bg1"/>
+        </a:solidFill>
+        <a:effectLst/>
+      </p:bgPr>
+    </p:bg>
+    <p:spTree>
+      <p:nvGrpSpPr>
+        <p:cNvPr id="1" name=""/>
+        <p:cNvGrpSpPr/>
+        <p:nvPr/>
+      </p:nvGrpSpPr>
+      <p:grpSpPr>
+        <a:xfrm>
+          <a:off x="0" y="0"/>
+          <a:ext cx="0" cy="0"/>
+          <a:chOff x="0" y="0"/>
+          <a:chExt cx="0" cy="0"/>
+        </a:xfrm>
+      </p:grpSpPr>
+      <p:sp>
+        <p:nvSpPr>
+          <p:cNvPr id="9" name="Rectangle 8">
+            <a:extLst>
+              <a:ext uri="{FF2B5EF4-FFF2-40B4-BE49-F238E27FC236}">
+                <a16:creationId xmlns:a16="http://schemas.microsoft.com/office/drawing/2014/main" id="{8D70B121-56F4-4848-B38B-182089D909FA}"/>
+              </a:ext>
+              <a:ext uri="{C183D7F6-B498-43B3-948B-1728B52AA6E4}">
+                <adec:decorative xmlns:adec="http://schemas.microsoft.com/office/drawing/2017/decorative" val="1"/>
+              </a:ext>
+            </a:extLst>
+          </p:cNvPr>
+          <p:cNvSpPr>
+            <a:spLocks noGrp="1" noRot="1" noChangeAspect="1" noMove="1" noResize="1" noEditPoints="1" noAdjustHandles="1" noChangeArrowheads="1" noChangeShapeType="1" noTextEdit="1"/>
+          </p:cNvSpPr>
+          <p:nvPr>
+            <p:extLst>
+              <p:ext uri="{386F3935-93C4-4BCD-93E2-E3B085C9AB24}">
+                <p16:designElem xmlns:p16="http://schemas.microsoft.com/office/powerpoint/2015/main" val="1"/>
+              </p:ext>
+            </p:extLst>
+          </p:nvPr>
+        </p:nvSpPr>
+        <p:spPr bwMode="ltGray">
+          <a:xfrm>
+            <a:off x="321564" y="320040"/>
+            <a:ext cx="11548872" cy="6217920"/>
+          </a:xfrm>
+          <a:prstGeom prst="rect">
+            <a:avLst/>
+          </a:prstGeom>
+          <a:solidFill>
+            <a:schemeClr val="tx1">
+              <a:alpha val="8000"/>
+            </a:schemeClr>
+          </a:solidFill>
+          <a:ln w="127000" cap="sq" cmpd="thinThick">
+            <a:noFill/>
+          </a:ln>
+        </p:spPr>
+        <p:style>
+          <a:lnRef idx="2">
+            <a:schemeClr val="accent1">
+              <a:shade val="50000"/>
+            </a:schemeClr>
+          </a:lnRef>
+          <a:fillRef idx="1">
+            <a:schemeClr val="accent1"/>
+          </a:fillRef>
+          <a:effectRef idx="0">
+            <a:schemeClr val="accent1"/>
+          </a:effectRef>
+          <a:fontRef idx="minor">
+            <a:schemeClr val="lt1"/>
+          </a:fontRef>
+        </p:style>
+        <p:txBody>
+          <a:bodyPr rtlCol="0" anchor="ctr"/>
+          <a:lstStyle/>
+          <a:p>
+            <a:pPr algn="ctr"/>
+            <a:endParaRPr lang="en-US"/>
+          </a:p>
+        </p:txBody>
+      </p:sp>
+      <p:sp>
+        <p:nvSpPr>
+          <p:cNvPr id="2" name="Title 1">
+            <a:extLst>
+              <a:ext uri="{FF2B5EF4-FFF2-40B4-BE49-F238E27FC236}">
+                <a16:creationId xmlns:a16="http://schemas.microsoft.com/office/drawing/2014/main" id="{716F2B93-A2BD-40E2-9FD0-F93D173411A3}"/>
+              </a:ext>
+            </a:extLst>
+          </p:cNvPr>
+          <p:cNvSpPr>
+            <a:spLocks noGrp="1"/>
+          </p:cNvSpPr>
+          <p:nvPr>
+            <p:ph type="title"/>
+          </p:nvPr>
+        </p:nvSpPr>
+        <p:spPr>
+          <a:xfrm>
+            <a:off x="838200" y="963877"/>
+            <a:ext cx="3494362" cy="4930246"/>
+          </a:xfrm>
+        </p:spPr>
+        <p:txBody>
+          <a:bodyPr>
+            <a:normAutofit/>
+          </a:bodyPr>
+          <a:lstStyle/>
+          <a:p>
+            <a:pPr algn="r"/>
+            <a:r>
+              <a:rPr lang="en-US">
+                <a:solidFill>
+                  <a:schemeClr val="accent1"/>
+                </a:solidFill>
+              </a:rPr>
+              <a:t>What is lettering</a:t>
+            </a:r>
+          </a:p>
+        </p:txBody>
+      </p:sp>
+      <p:cxnSp>
+        <p:nvCxnSpPr>
+          <p:cNvPr id="11" name="Straight Connector 10">
+            <a:extLst>
+              <a:ext uri="{FF2B5EF4-FFF2-40B4-BE49-F238E27FC236}">
+                <a16:creationId xmlns:a16="http://schemas.microsoft.com/office/drawing/2014/main" id="{2D72A2C9-F3CA-4216-8BAD-FA4C970C3C4E}"/>
+              </a:ext>
+              <a:ext uri="{C183D7F6-B498-43B3-948B-1728B52AA6E4}">
+                <adec:decorative xmlns:adec="http://schemas.microsoft.com/office/drawing/2017/decorative" val="1"/>
+              </a:ext>
+            </a:extLst>
+          </p:cNvPr>
+          <p:cNvCxnSpPr>
+            <a:cxnSpLocks noGrp="1" noRot="1" noChangeAspect="1" noMove="1" noResize="1" noEditPoints="1" noAdjustHandles="1" noChangeArrowheads="1" noChangeShapeType="1"/>
+          </p:cNvCxnSpPr>
+          <p:nvPr>
+            <p:extLst>
+              <p:ext uri="{386F3935-93C4-4BCD-93E2-E3B085C9AB24}">
+                <p16:designElem xmlns:p16="http://schemas.microsoft.com/office/powerpoint/2015/main" val="1"/>
+              </p:ext>
+            </p:extLst>
+          </p:nvPr>
+        </p:nvCxnSpPr>
+        <p:spPr>
+          <a:xfrm>
+            <a:off x="4654296" y="2057400"/>
+            <a:ext cx="0" cy="2743200"/>
+          </a:xfrm>
+          <a:prstGeom prst="line">
+            <a:avLst/>
+          </a:prstGeom>
+          <a:ln w="19050">
+            <a:solidFill>
+              <a:schemeClr val="tx1">
+                <a:lumMod val="85000"/>
+                <a:lumOff val="15000"/>
+              </a:schemeClr>
+            </a:solidFill>
+          </a:ln>
+        </p:spPr>
+        <p:style>
+          <a:lnRef idx="1">
+            <a:schemeClr val="accent1"/>
+          </a:lnRef>
+          <a:fillRef idx="0">
+            <a:schemeClr val="accent1"/>
+          </a:fillRef>
+          <a:effectRef idx="0">
+            <a:schemeClr val="accent1"/>
+          </a:effectRef>
+          <a:fontRef idx="minor">
+            <a:schemeClr val="tx1"/>
+          </a:fontRef>
+        </p:style>
+      </p:cxnSp>
+      <p:sp>
+        <p:nvSpPr>
+          <p:cNvPr id="3" name="Content Placeholder 2">
+            <a:extLst>
+              <a:ext uri="{FF2B5EF4-FFF2-40B4-BE49-F238E27FC236}">
+                <a16:creationId xmlns:a16="http://schemas.microsoft.com/office/drawing/2014/main" id="{E9311B71-3167-477F-B1AB-5C48044BC8E1}"/>
+              </a:ext>
+            </a:extLst>
+          </p:cNvPr>
+          <p:cNvSpPr>
+            <a:spLocks noGrp="1"/>
+          </p:cNvSpPr>
+          <p:nvPr>
+            <p:ph idx="1"/>
+          </p:nvPr>
+        </p:nvSpPr>
+        <p:spPr>
+          <a:xfrm>
+            <a:off x="4976031" y="963877"/>
+            <a:ext cx="6377769" cy="4930246"/>
+          </a:xfrm>
+        </p:spPr>
+        <p:txBody>
+          <a:bodyPr anchor="ctr">
+            <a:normAutofit/>
+          </a:bodyPr>
+          <a:lstStyle/>
+          <a:p>
+            <a:r>
+              <a:rPr lang="en-US" sz="2400"/>
+              <a:t>Purpose is to clarify the views or projections</a:t>
+            </a:r>
+          </a:p>
+          <a:p>
+            <a:r>
+              <a:rPr lang="en-US" sz="2400"/>
+              <a:t>Notes may specify materials and processes</a:t>
+            </a:r>
+          </a:p>
+          <a:p>
+            <a:r>
+              <a:rPr lang="en-US" sz="2400"/>
+              <a:t>Most drafters are required to letter drawings freehand</a:t>
+            </a:r>
+          </a:p>
+          <a:p>
+            <a:r>
+              <a:rPr lang="en-US" sz="2400"/>
+              <a:t>Lettering is about 20% of manual work for any drafter</a:t>
+            </a:r>
+          </a:p>
+          <a:p>
+            <a:pPr marL="411480" lvl="1" indent="0">
+              <a:buNone/>
+            </a:pPr>
+            <a:endParaRPr lang="en-US" dirty="0"/>
+          </a:p>
+          <a:p>
+            <a:endParaRPr lang="en-US" sz="2400"/>
+          </a:p>
+          <a:p>
+            <a:endParaRPr lang="en-US" sz="2400"/>
+          </a:p>
+        </p:txBody>
+      </p:sp>
+      <p:sp>
+        <p:nvSpPr>
+          <p:cNvPr id="4" name="Footer Placeholder 3">
+            <a:extLst>
+              <a:ext uri="{FF2B5EF4-FFF2-40B4-BE49-F238E27FC236}">
+                <a16:creationId xmlns:a16="http://schemas.microsoft.com/office/drawing/2014/main" id="{DA40730A-829B-4DFE-8CAE-D606FCE1126E}"/>
+              </a:ext>
+            </a:extLst>
+          </p:cNvPr>
+          <p:cNvSpPr>
+            <a:spLocks noGrp="1"/>
+          </p:cNvSpPr>
+          <p:nvPr>
+            <p:ph type="ftr" sz="quarter" idx="11"/>
+          </p:nvPr>
+        </p:nvSpPr>
+        <p:spPr>
+          <a:xfrm>
+            <a:off x="4976031" y="6033479"/>
+            <a:ext cx="5259985" cy="365125"/>
+          </a:xfrm>
+        </p:spPr>
+        <p:txBody>
+          <a:bodyPr>
+            <a:normAutofit/>
+          </a:bodyPr>
+          <a:lstStyle/>
+          <a:p>
+            <a:pPr algn="l">
+              <a:spcAft>
+                <a:spcPts val="600"/>
+              </a:spcAft>
+            </a:pPr>
+            <a:r>
+              <a:rPr lang="en-US" sz="1050">
+                <a:solidFill>
+                  <a:schemeClr val="tx1">
+                    <a:alpha val="80000"/>
+                  </a:schemeClr>
+                </a:solidFill>
+              </a:rPr>
+              <a:t>Add a footer</a:t>
+            </a:r>
+          </a:p>
+        </p:txBody>
+      </p:sp>
+    </p:spTree>
+    <p:extLst>
+      <p:ext uri="{BB962C8B-B14F-4D97-AF65-F5344CB8AC3E}">
+        <p14:creationId xmlns:p14="http://schemas.microsoft.com/office/powerpoint/2010/main" val="1269551219"/>
+      </p:ext>
+    </p:extLst>
+  </p:cSld>
+  <p:clrMapOvr>
+    <a:masterClrMapping/>
+  </p:clrMapOvr>
+  <mc:AlternateContent xmlns:mc="http://schemas.openxmlformats.org/markup-compatibility/2006" xmlns:p14="http://schemas.microsoft.com/office/powerpoint/2010/main">
+    <mc:Choice Requires="p14">
+      <p:transition spd="med" p14:dur="700">
+        <p:fade/>
+      </p:transition>
+    </mc:Choice>
+    <mc:Fallback xmlns="">
+      <p:transition spd="med">
+        <p:fade/>
+      </p:transition>
+    </mc:Fallback>
+  </mc:AlternateContent>
+</p:sld>
+</file>
+
+<file path=ppt/slides/slide5.xml><?xml version="1.0" encoding="utf-8"?>
+<p:sld xmlns:a="http://schemas.openxmlformats.org/drawingml/2006/main" xmlns:r="http://schemas.openxmlformats.org/officeDocument/2006/relationships" xmlns:p="http://schemas.openxmlformats.org/presentationml/2006/main">
+  <p:cSld>
+    <p:bg>
+      <p:bgPr>
+        <a:solidFill>
+          <a:schemeClr val="bg1"/>
+        </a:solidFill>
+        <a:effectLst/>
+      </p:bgPr>
+    </p:bg>
+    <p:spTree>
+      <p:nvGrpSpPr>
+        <p:cNvPr id="1" name=""/>
+        <p:cNvGrpSpPr/>
+        <p:nvPr/>
+      </p:nvGrpSpPr>
+      <p:grpSpPr>
+        <a:xfrm>
+          <a:off x="0" y="0"/>
+          <a:ext cx="0" cy="0"/>
+          <a:chOff x="0" y="0"/>
+          <a:chExt cx="0" cy="0"/>
+        </a:xfrm>
+      </p:grpSpPr>
+      <p:sp>
+        <p:nvSpPr>
+          <p:cNvPr id="71" name="Rectangle 70">
+            <a:extLst>
+              <a:ext uri="{FF2B5EF4-FFF2-40B4-BE49-F238E27FC236}">
+                <a16:creationId xmlns:a16="http://schemas.microsoft.com/office/drawing/2014/main" id="{4038CB10-1F5C-4D54-9DF7-12586DE5B007}"/>
+              </a:ext>
+              <a:ext uri="{C183D7F6-B498-43B3-948B-1728B52AA6E4}">
+                <adec:decorative xmlns:adec="http://schemas.microsoft.com/office/drawing/2017/decorative" val="1"/>
+              </a:ext>
+            </a:extLst>
+          </p:cNvPr>
+          <p:cNvSpPr>
+            <a:spLocks noGrp="1" noRot="1" noChangeAspect="1" noMove="1" noResize="1" noEditPoints="1" noAdjustHandles="1" noChangeArrowheads="1" noChangeShapeType="1" noTextEdit="1"/>
+          </p:cNvSpPr>
+          <p:nvPr>
+            <p:extLst>
+              <p:ext uri="{386F3935-93C4-4BCD-93E2-E3B085C9AB24}">
+                <p16:designElem xmlns:p16="http://schemas.microsoft.com/office/powerpoint/2015/main" val="1"/>
+              </p:ext>
+            </p:extLst>
+          </p:nvPr>
+        </p:nvSpPr>
+        <p:spPr>
+          <a:xfrm>
+            <a:off x="327546" y="4572000"/>
+            <a:ext cx="7058307" cy="1964266"/>
+          </a:xfrm>
+          <a:prstGeom prst="rect">
+            <a:avLst/>
+          </a:prstGeom>
+          <a:solidFill>
+            <a:schemeClr val="accent1"/>
+          </a:solidFill>
+          <a:ln>
+            <a:noFill/>
+          </a:ln>
+        </p:spPr>
+        <p:style>
+          <a:lnRef idx="2">
+            <a:schemeClr val="accent1">
+              <a:shade val="50000"/>
+            </a:schemeClr>
+          </a:lnRef>
+          <a:fillRef idx="1">
+            <a:schemeClr val="accent1"/>
+          </a:fillRef>
+          <a:effectRef idx="0">
+            <a:schemeClr val="accent1"/>
+          </a:effectRef>
+          <a:fontRef idx="minor">
+            <a:schemeClr val="lt1"/>
+          </a:fontRef>
+        </p:style>
+        <p:txBody>
+          <a:bodyPr rtlCol="0" anchor="ctr"/>
+          <a:lstStyle/>
+          <a:p>
+            <a:pPr marL="0" marR="0" lvl="0" indent="0" algn="ctr" defTabSz="914400" rtl="0" eaLnBrk="1" fontAlgn="auto" latinLnBrk="0" hangingPunct="1">
+              <a:lnSpc>
+                <a:spcPct val="100000"/>
+              </a:lnSpc>
+              <a:spcBef>
+                <a:spcPts val="0"/>
+              </a:spcBef>
+              <a:spcAft>
+                <a:spcPts val="0"/>
+              </a:spcAft>
+              <a:buClrTx/>
+              <a:buSzTx/>
+              <a:buFontTx/>
+              <a:buNone/>
+              <a:tabLst/>
+              <a:defRPr/>
+            </a:pPr>
+            <a:endParaRPr kumimoji="0" lang="en-US" sz="1800" b="0" i="0" u="none" strike="noStrike" kern="1200" cap="none" spc="0" normalizeH="0" baseline="0" noProof="0">
+              <a:ln>
+                <a:noFill/>
+              </a:ln>
+              <a:solidFill>
+                <a:prstClr val="white"/>
+              </a:solidFill>
+              <a:effectLst/>
+              <a:uLnTx/>
+              <a:uFillTx/>
+              <a:latin typeface="Calibri" panose="020F0502020204030204"/>
+              <a:ea typeface="+mn-ea"/>
+              <a:cs typeface="+mn-cs"/>
+            </a:endParaRPr>
+          </a:p>
+        </p:txBody>
+      </p:sp>
+      <p:sp>
+        <p:nvSpPr>
+          <p:cNvPr id="2" name="Title 1">
+            <a:extLst>
+              <a:ext uri="{FF2B5EF4-FFF2-40B4-BE49-F238E27FC236}">
+                <a16:creationId xmlns:a16="http://schemas.microsoft.com/office/drawing/2014/main" id="{C0CD3824-41FA-4546-AFCD-2A01FEF6F1C3}"/>
+              </a:ext>
+            </a:extLst>
+          </p:cNvPr>
+          <p:cNvSpPr>
+            <a:spLocks noGrp="1"/>
+          </p:cNvSpPr>
+          <p:nvPr>
+            <p:ph type="title"/>
+          </p:nvPr>
+        </p:nvSpPr>
+        <p:spPr>
+          <a:xfrm>
+            <a:off x="524256" y="4767072"/>
+            <a:ext cx="6594189" cy="1625210"/>
+          </a:xfrm>
+        </p:spPr>
+        <p:txBody>
+          <a:bodyPr>
+            <a:normAutofit/>
+          </a:bodyPr>
+          <a:lstStyle/>
+          <a:p>
+            <a:pPr algn="r"/>
+            <a:r>
+              <a:rPr lang="en-US">
+                <a:solidFill>
+                  <a:srgbClr val="FFFFFF"/>
+                </a:solidFill>
+              </a:rPr>
+              <a:t>Lettering technique</a:t>
+            </a:r>
+          </a:p>
+        </p:txBody>
+      </p:sp>
+      <p:pic>
+        <p:nvPicPr>
+          <p:cNvPr id="1026" name="Picture 2" descr="Image result for drafting lettering technique">
+            <a:extLst>
+              <a:ext uri="{FF2B5EF4-FFF2-40B4-BE49-F238E27FC236}">
+                <a16:creationId xmlns:a16="http://schemas.microsoft.com/office/drawing/2014/main" id="{99EDA05A-8342-458F-ABAD-41079AAAAE16}"/>
+              </a:ext>
+            </a:extLst>
+          </p:cNvPr>
+          <p:cNvPicPr>
+            <a:picLocks noChangeAspect="1" noChangeArrowheads="1"/>
+          </p:cNvPicPr>
+          <p:nvPr/>
+        </p:nvPicPr>
+        <p:blipFill rotWithShape="1">
+          <a:blip r:embed="rId2">
+            <a:extLst>
+              <a:ext uri="{28A0092B-C50C-407E-A947-70E740481C1C}">
+                <a14:useLocalDpi xmlns:a14="http://schemas.microsoft.com/office/drawing/2010/main" val="0"/>
+              </a:ext>
+            </a:extLst>
+          </a:blip>
+          <a:srcRect t="423" r="1" b="21989"/>
+          <a:stretch/>
+        </p:blipFill>
+        <p:spPr bwMode="auto">
+          <a:xfrm>
+            <a:off x="327547" y="321733"/>
+            <a:ext cx="7058306" cy="4107392"/>
+          </a:xfrm>
+          <a:prstGeom prst="rect">
+            <a:avLst/>
+          </a:prstGeom>
+          <a:noFill/>
+          <a:extLst>
+            <a:ext uri="{909E8E84-426E-40DD-AFC4-6F175D3DCCD1}">
+              <a14:hiddenFill xmlns:a14="http://schemas.microsoft.com/office/drawing/2010/main">
+                <a:solidFill>
+                  <a:srgbClr val="FFFFFF"/>
+                </a:solidFill>
+              </a14:hiddenFill>
+            </a:ext>
+          </a:extLst>
+        </p:spPr>
+      </p:pic>
+      <p:sp>
+        <p:nvSpPr>
+          <p:cNvPr id="4" name="Footer Placeholder 3">
+            <a:extLst>
+              <a:ext uri="{FF2B5EF4-FFF2-40B4-BE49-F238E27FC236}">
+                <a16:creationId xmlns:a16="http://schemas.microsoft.com/office/drawing/2014/main" id="{F2C807B6-1EF7-457A-9AA4-A8D575B1919D}"/>
+              </a:ext>
+            </a:extLst>
+          </p:cNvPr>
+          <p:cNvSpPr>
+            <a:spLocks noGrp="1"/>
+          </p:cNvSpPr>
+          <p:nvPr>
+            <p:ph type="ftr" sz="quarter" idx="11"/>
+          </p:nvPr>
+        </p:nvSpPr>
+        <p:spPr>
+          <a:xfrm>
+            <a:off x="524256" y="6535157"/>
+            <a:ext cx="6594189" cy="274320"/>
+          </a:xfrm>
+        </p:spPr>
+        <p:txBody>
+          <a:bodyPr>
+            <a:normAutofit/>
+          </a:bodyPr>
+          <a:lstStyle/>
+          <a:p>
+            <a:pPr algn="r">
+              <a:spcAft>
+                <a:spcPts val="600"/>
+              </a:spcAft>
+            </a:pPr>
+            <a:r>
+              <a:rPr lang="en-US">
+                <a:solidFill>
+                  <a:prstClr val="black">
+                    <a:tint val="75000"/>
+                  </a:prstClr>
+                </a:solidFill>
+              </a:rPr>
+              <a:t>Add a footer</a:t>
+            </a:r>
+          </a:p>
+        </p:txBody>
+      </p:sp>
+      <p:sp>
+        <p:nvSpPr>
+          <p:cNvPr id="1029" name="Rectangle 72">
+            <a:extLst>
+              <a:ext uri="{FF2B5EF4-FFF2-40B4-BE49-F238E27FC236}">
+                <a16:creationId xmlns:a16="http://schemas.microsoft.com/office/drawing/2014/main" id="{73ED6512-6858-4552-B699-9A97FE9A4EA2}"/>
+              </a:ext>
+              <a:ext uri="{C183D7F6-B498-43B3-948B-1728B52AA6E4}">
+                <adec:decorative xmlns:adec="http://schemas.microsoft.com/office/drawing/2017/decorative" val="1"/>
+              </a:ext>
+            </a:extLst>
+          </p:cNvPr>
+          <p:cNvSpPr>
+            <a:spLocks noGrp="1" noRot="1" noChangeAspect="1" noMove="1" noResize="1" noEditPoints="1" noAdjustHandles="1" noChangeArrowheads="1" noChangeShapeType="1" noTextEdit="1"/>
+          </p:cNvSpPr>
+          <p:nvPr>
+            <p:extLst>
+              <p:ext uri="{386F3935-93C4-4BCD-93E2-E3B085C9AB24}">
+                <p16:designElem xmlns:p16="http://schemas.microsoft.com/office/powerpoint/2015/main" val="1"/>
+              </p:ext>
+            </p:extLst>
+          </p:nvPr>
+        </p:nvSpPr>
+        <p:spPr>
+          <a:xfrm>
+            <a:off x="7534655" y="321732"/>
+            <a:ext cx="4335613" cy="6214534"/>
+          </a:xfrm>
+          <a:prstGeom prst="rect">
+            <a:avLst/>
+          </a:prstGeom>
+          <a:solidFill>
+            <a:srgbClr val="404040"/>
+          </a:solidFill>
+          <a:ln>
+            <a:noFill/>
+          </a:ln>
+        </p:spPr>
+        <p:style>
+          <a:lnRef idx="2">
+            <a:schemeClr val="accent1">
+              <a:shade val="50000"/>
+            </a:schemeClr>
+          </a:lnRef>
+          <a:fillRef idx="1">
+            <a:schemeClr val="accent1"/>
+          </a:fillRef>
+          <a:effectRef idx="0">
+            <a:schemeClr val="accent1"/>
+          </a:effectRef>
+          <a:fontRef idx="minor">
+            <a:schemeClr val="lt1"/>
+          </a:fontRef>
+        </p:style>
+        <p:txBody>
+          <a:bodyPr rtlCol="0" anchor="ctr"/>
+          <a:lstStyle/>
+          <a:p>
+            <a:pPr marL="0" marR="0" lvl="0" indent="0" algn="ctr" defTabSz="914400" rtl="0" eaLnBrk="1" fontAlgn="auto" latinLnBrk="0" hangingPunct="1">
+              <a:lnSpc>
+                <a:spcPct val="100000"/>
+              </a:lnSpc>
+              <a:spcBef>
+                <a:spcPts val="0"/>
+              </a:spcBef>
+              <a:spcAft>
+                <a:spcPts val="0"/>
+              </a:spcAft>
+              <a:buClrTx/>
+              <a:buSzTx/>
+              <a:buFontTx/>
+              <a:buNone/>
+              <a:tabLst/>
+              <a:defRPr/>
+            </a:pPr>
+            <a:endParaRPr kumimoji="0" lang="en-US" sz="1800" b="0" i="0" u="none" strike="noStrike" kern="1200" cap="none" spc="0" normalizeH="0" baseline="0" noProof="0">
+              <a:ln>
+                <a:noFill/>
+              </a:ln>
+              <a:solidFill>
+                <a:prstClr val="white"/>
+              </a:solidFill>
+              <a:effectLst/>
+              <a:uLnTx/>
+              <a:uFillTx/>
+              <a:latin typeface="Calibri" panose="020F0502020204030204"/>
+              <a:ea typeface="+mn-ea"/>
+              <a:cs typeface="+mn-cs"/>
+            </a:endParaRPr>
+          </a:p>
+        </p:txBody>
+      </p:sp>
+      <p:sp>
+        <p:nvSpPr>
+          <p:cNvPr id="3" name="Content Placeholder 2">
+            <a:extLst>
+              <a:ext uri="{FF2B5EF4-FFF2-40B4-BE49-F238E27FC236}">
+                <a16:creationId xmlns:a16="http://schemas.microsoft.com/office/drawing/2014/main" id="{A2EC288F-4A88-4641-9F49-11018BF8CF49}"/>
+              </a:ext>
+            </a:extLst>
+          </p:cNvPr>
+          <p:cNvSpPr>
+            <a:spLocks noGrp="1"/>
+          </p:cNvSpPr>
+          <p:nvPr>
+            <p:ph idx="1"/>
+          </p:nvPr>
+        </p:nvSpPr>
+        <p:spPr>
+          <a:xfrm>
+            <a:off x="8029319" y="917725"/>
+            <a:ext cx="3424739" cy="4852362"/>
+          </a:xfrm>
+        </p:spPr>
+        <p:txBody>
+          <a:bodyPr anchor="ctr">
+            <a:normAutofit/>
+          </a:bodyPr>
+          <a:lstStyle/>
+          <a:p>
+            <a:r>
+              <a:rPr lang="en-US" sz="2000">
+                <a:solidFill>
+                  <a:srgbClr val="FFFFFF"/>
+                </a:solidFill>
+              </a:rPr>
+              <a:t>Use less pressure on your pencil</a:t>
+            </a:r>
+          </a:p>
+          <a:p>
+            <a:r>
+              <a:rPr lang="en-US" sz="2000">
+                <a:solidFill>
+                  <a:srgbClr val="FFFFFF"/>
+                </a:solidFill>
+              </a:rPr>
+              <a:t>Having a pencil with a point will help produce high quality lettering that can be copied easily and clearly</a:t>
+            </a:r>
+          </a:p>
+          <a:p>
+            <a:r>
+              <a:rPr lang="en-US" sz="2000">
+                <a:solidFill>
+                  <a:srgbClr val="FFFFFF"/>
+                </a:solidFill>
+              </a:rPr>
+              <a:t>Have your forearm sully supported with your hand resting on its side</a:t>
+            </a:r>
+          </a:p>
+          <a:p>
+            <a:r>
+              <a:rPr lang="en-US" sz="2000">
+                <a:solidFill>
+                  <a:srgbClr val="FFFFFF"/>
+                </a:solidFill>
+              </a:rPr>
+              <a:t>Take your time and relax, pausing is most likely needed</a:t>
+            </a:r>
+          </a:p>
+          <a:p>
+            <a:r>
+              <a:rPr lang="en-US" sz="2000">
+                <a:solidFill>
+                  <a:srgbClr val="FFFFFF"/>
+                </a:solidFill>
+              </a:rPr>
+              <a:t>“Pull” the pencil across the page to not dig into the drawing</a:t>
+            </a:r>
+          </a:p>
+        </p:txBody>
+      </p:sp>
+    </p:spTree>
+    <p:extLst>
+      <p:ext uri="{BB962C8B-B14F-4D97-AF65-F5344CB8AC3E}">
+        <p14:creationId xmlns:p14="http://schemas.microsoft.com/office/powerpoint/2010/main" val="1401278197"/>
+      </p:ext>
+    </p:extLst>
+  </p:cSld>
+  <p:clrMapOvr>
+    <a:masterClrMapping/>
+  </p:clrMapOvr>
+  <mc:AlternateContent xmlns:mc="http://schemas.openxmlformats.org/markup-compatibility/2006" xmlns:p14="http://schemas.microsoft.com/office/powerpoint/2010/main">
+    <mc:Choice Requires="p14">
+      <p:transition spd="med" p14:dur="700">
+        <p:fade/>
+      </p:transition>
+    </mc:Choice>
+    <mc:Fallback xmlns="">
+      <p:transition spd="med">
+        <p:fade/>
+      </p:transition>
+    </mc:Fallback>
+  </mc:AlternateContent>
+</p:sld>
+</file>
+
+<file path=ppt/slides/slide6.xml><?xml version="1.0" encoding="utf-8"?>
+<p:sld xmlns:a="http://schemas.openxmlformats.org/drawingml/2006/main" xmlns:r="http://schemas.openxmlformats.org/officeDocument/2006/relationships" xmlns:p="http://schemas.openxmlformats.org/presentationml/2006/main">
+  <p:cSld>
+    <p:bg>
+      <p:bgPr>
+        <a:solidFill>
+          <a:schemeClr val="bg1">
+            <a:tint val="95000"/>
+            <a:satMod val="170000"/>
+          </a:schemeClr>
+        </a:solidFill>
+        <a:effectLst/>
+      </p:bgPr>
+    </p:bg>
+    <p:spTree>
+      <p:nvGrpSpPr>
+        <p:cNvPr id="1" name=""/>
+        <p:cNvGrpSpPr/>
+        <p:nvPr/>
+      </p:nvGrpSpPr>
+      <p:grpSpPr>
+        <a:xfrm>
+          <a:off x="0" y="0"/>
+          <a:ext cx="0" cy="0"/>
+          <a:chOff x="0" y="0"/>
+          <a:chExt cx="0" cy="0"/>
+        </a:xfrm>
+      </p:grpSpPr>
+      <p:sp>
+        <p:nvSpPr>
+          <p:cNvPr id="2" name="Title 1">
+            <a:extLst>
+              <a:ext uri="{FF2B5EF4-FFF2-40B4-BE49-F238E27FC236}">
+                <a16:creationId xmlns:a16="http://schemas.microsoft.com/office/drawing/2014/main" id="{26C2B765-1E7B-46EB-8F54-380E9853517C}"/>
+              </a:ext>
+            </a:extLst>
+          </p:cNvPr>
+          <p:cNvSpPr>
+            <a:spLocks noGrp="1"/>
+          </p:cNvSpPr>
+          <p:nvPr>
+            <p:ph type="title"/>
+          </p:nvPr>
+        </p:nvSpPr>
+        <p:spPr>
+          <a:xfrm>
+            <a:off x="1023257" y="965198"/>
+            <a:ext cx="6766078" cy="4927601"/>
+          </a:xfrm>
+        </p:spPr>
+        <p:txBody>
+          <a:bodyPr vert="horz" lIns="91440" tIns="45720" rIns="91440" bIns="45720" rtlCol="0" anchor="ctr">
+            <a:normAutofit/>
+          </a:bodyPr>
+          <a:lstStyle/>
+          <a:p>
+            <a:pPr algn="r"/>
+            <a:r>
+              <a:rPr lang="en-US" sz="6000" kern="1200">
+                <a:solidFill>
+                  <a:schemeClr val="tx1"/>
+                </a:solidFill>
+                <a:latin typeface="+mj-lt"/>
+                <a:ea typeface="+mj-ea"/>
+                <a:cs typeface="+mj-cs"/>
+              </a:rPr>
+              <a:t>Lettering Guide</a:t>
+            </a:r>
+          </a:p>
+        </p:txBody>
+      </p:sp>
+      <p:sp>
+        <p:nvSpPr>
+          <p:cNvPr id="16" name="Rectangle 15">
+            <a:extLst>
+              <a:ext uri="{FF2B5EF4-FFF2-40B4-BE49-F238E27FC236}">
+                <a16:creationId xmlns:a16="http://schemas.microsoft.com/office/drawing/2014/main" id="{793EF0C2-EE57-40DD-B754-BF1477FABABB}"/>
+              </a:ext>
+              <a:ext uri="{C183D7F6-B498-43B3-948B-1728B52AA6E4}">
+                <adec:decorative xmlns:adec="http://schemas.microsoft.com/office/drawing/2017/decorative" val="1"/>
+              </a:ext>
+            </a:extLst>
+          </p:cNvPr>
+          <p:cNvSpPr>
+            <a:spLocks noGrp="1" noRot="1" noChangeAspect="1" noMove="1" noResize="1" noEditPoints="1" noAdjustHandles="1" noChangeArrowheads="1" noChangeShapeType="1" noTextEdit="1"/>
+          </p:cNvSpPr>
+          <p:nvPr>
+            <p:extLst>
+              <p:ext uri="{386F3935-93C4-4BCD-93E2-E3B085C9AB24}">
+                <p16:designElem xmlns:p16="http://schemas.microsoft.com/office/powerpoint/2015/main" val="1"/>
+              </p:ext>
+            </p:extLst>
+          </p:nvPr>
+        </p:nvSpPr>
+        <p:spPr>
+          <a:xfrm>
+            <a:off x="8119870" y="0"/>
+            <a:ext cx="4072130" cy="6858000"/>
+          </a:xfrm>
+          <a:prstGeom prst="rect">
+            <a:avLst/>
+          </a:prstGeom>
+          <a:solidFill>
+            <a:schemeClr val="accent1">
+              <a:alpha val="80000"/>
+            </a:schemeClr>
+          </a:solidFill>
+          <a:ln>
+            <a:noFill/>
+          </a:ln>
+        </p:spPr>
+        <p:style>
+          <a:lnRef idx="2">
+            <a:schemeClr val="accent1">
+              <a:shade val="50000"/>
+            </a:schemeClr>
+          </a:lnRef>
+          <a:fillRef idx="1">
+            <a:schemeClr val="accent1"/>
+          </a:fillRef>
+          <a:effectRef idx="0">
+            <a:schemeClr val="accent1"/>
+          </a:effectRef>
+          <a:fontRef idx="minor">
+            <a:schemeClr val="lt1"/>
+          </a:fontRef>
+        </p:style>
+        <p:txBody>
+          <a:bodyPr rtlCol="0" anchor="ctr"/>
+          <a:lstStyle/>
+          <a:p>
+            <a:pPr algn="ctr"/>
+            <a:endParaRPr lang="en-US"/>
+          </a:p>
+        </p:txBody>
+      </p:sp>
+      <p:sp>
+        <p:nvSpPr>
+          <p:cNvPr id="3" name="Content Placeholder 2">
+            <a:extLst>
+              <a:ext uri="{FF2B5EF4-FFF2-40B4-BE49-F238E27FC236}">
+                <a16:creationId xmlns:a16="http://schemas.microsoft.com/office/drawing/2014/main" id="{3C5BBD25-9076-4AEC-B1A1-556551C0FD64}"/>
+              </a:ext>
+            </a:extLst>
+          </p:cNvPr>
+          <p:cNvSpPr>
+            <a:spLocks noGrp="1"/>
+          </p:cNvSpPr>
+          <p:nvPr>
+            <p:ph idx="1"/>
+          </p:nvPr>
+        </p:nvSpPr>
+        <p:spPr>
+          <a:xfrm>
+            <a:off x="8454570" y="965199"/>
+            <a:ext cx="3093963" cy="4927602"/>
+          </a:xfrm>
+        </p:spPr>
+        <p:txBody>
+          <a:bodyPr vert="horz" lIns="91440" tIns="45720" rIns="91440" bIns="45720" rtlCol="0" anchor="ctr">
+            <a:normAutofit/>
+          </a:bodyPr>
+          <a:lstStyle/>
+          <a:p>
+            <a:pPr marL="0" indent="0">
+              <a:buNone/>
+            </a:pPr>
+            <a:r>
+              <a:rPr lang="en-US" sz="2000" kern="1200">
+                <a:solidFill>
+                  <a:srgbClr val="FFFFFF"/>
+                </a:solidFill>
+                <a:latin typeface="+mn-lt"/>
+                <a:ea typeface="+mn-ea"/>
+                <a:cs typeface="+mn-cs"/>
+              </a:rPr>
+              <a:t>The Ames Lettering Guide can help provide guidelines for freehand technical drawing</a:t>
+            </a:r>
+          </a:p>
+        </p:txBody>
+      </p:sp>
+      <p:sp>
+        <p:nvSpPr>
+          <p:cNvPr id="4" name="Footer Placeholder 3">
+            <a:extLst>
+              <a:ext uri="{FF2B5EF4-FFF2-40B4-BE49-F238E27FC236}">
+                <a16:creationId xmlns:a16="http://schemas.microsoft.com/office/drawing/2014/main" id="{9279740F-8AF1-4320-9AD2-4BFF935C2549}"/>
+              </a:ext>
+            </a:extLst>
+          </p:cNvPr>
+          <p:cNvSpPr>
+            <a:spLocks noGrp="1"/>
+          </p:cNvSpPr>
+          <p:nvPr>
+            <p:ph type="ftr" sz="quarter" idx="11"/>
+          </p:nvPr>
+        </p:nvSpPr>
+        <p:spPr>
+          <a:xfrm>
+            <a:off x="1023257" y="6356350"/>
+            <a:ext cx="4114800" cy="365125"/>
+          </a:xfrm>
+        </p:spPr>
+        <p:txBody>
+          <a:bodyPr vert="horz" lIns="91440" tIns="45720" rIns="91440" bIns="45720" rtlCol="0" anchor="ctr">
+            <a:normAutofit/>
+          </a:bodyPr>
+          <a:lstStyle/>
+          <a:p>
+            <a:pPr algn="l" defTabSz="914400">
+              <a:spcAft>
+                <a:spcPts val="600"/>
+              </a:spcAft>
+            </a:pPr>
+            <a:r>
+              <a:rPr lang="en-US" sz="1100" kern="1200">
+                <a:solidFill>
+                  <a:schemeClr val="tx1">
+                    <a:tint val="75000"/>
+                  </a:schemeClr>
+                </a:solidFill>
+                <a:latin typeface="+mn-lt"/>
+                <a:ea typeface="+mn-ea"/>
+                <a:cs typeface="+mn-cs"/>
+              </a:rPr>
+              <a:t>Add a footer</a:t>
+            </a:r>
+          </a:p>
+        </p:txBody>
+      </p:sp>
+    </p:spTree>
+    <p:extLst>
+      <p:ext uri="{BB962C8B-B14F-4D97-AF65-F5344CB8AC3E}">
+        <p14:creationId xmlns:p14="http://schemas.microsoft.com/office/powerpoint/2010/main" val="1317013365"/>
+      </p:ext>
+    </p:extLst>
+  </p:cSld>
+  <p:clrMapOvr>
+    <a:overrideClrMapping bg1="dk1" tx1="lt1" bg2="dk2" tx2="lt2" accent1="accent1" accent2="accent2" accent3="accent3" accent4="accent4" accent5="accent5" accent6="accent6" hlink="hlink" folHlink="folHlink"/>
+  </p:clrMapOvr>
+  <mc:AlternateContent xmlns:mc="http://schemas.openxmlformats.org/markup-compatibility/2006" xmlns:p14="http://schemas.microsoft.com/office/powerpoint/2010/main">
+    <mc:Choice Requires="p14">
+      <p:transition spd="med" p14:dur="700">
+        <p:fade/>
+      </p:transition>
+    </mc:Choice>
+    <mc:Fallback xmlns="">
+      <p:transition spd="med">
+        <p:fade/>
+      </p:transition>
+    </mc:Fallback>
+  </mc:AlternateContent>
+</p:sld>
+</file>
+
+<file path=ppt/slides/slide7.xml><?xml version="1.0" encoding="utf-8"?>
+<p:sld xmlns:a="http://schemas.openxmlformats.org/drawingml/2006/main" xmlns:r="http://schemas.openxmlformats.org/officeDocument/2006/relationships" xmlns:p="http://schemas.openxmlformats.org/presentationml/2006/main">
+  <p:cSld>
+    <p:bg>
+      <p:bgPr>
+        <a:solidFill>
+          <a:schemeClr val="bg1"/>
+        </a:solidFill>
+        <a:effectLst/>
+      </p:bgPr>
+    </p:bg>
+    <p:spTree>
+      <p:nvGrpSpPr>
+        <p:cNvPr id="1" name=""/>
+        <p:cNvGrpSpPr/>
+        <p:nvPr/>
+      </p:nvGrpSpPr>
+      <p:grpSpPr>
+        <a:xfrm>
+          <a:off x="0" y="0"/>
+          <a:ext cx="0" cy="0"/>
+          <a:chOff x="0" y="0"/>
+          <a:chExt cx="0" cy="0"/>
+        </a:xfrm>
+      </p:grpSpPr>
+      <p:pic>
+        <p:nvPicPr>
+          <p:cNvPr id="2053" name="Picture 2" descr="Image result for ames lettering guide">
+            <a:extLst>
+              <a:ext uri="{FF2B5EF4-FFF2-40B4-BE49-F238E27FC236}">
+                <a16:creationId xmlns:a16="http://schemas.microsoft.com/office/drawing/2014/main" id="{97FCC4BA-F7A9-4FB7-BCFF-48040CA0638E}"/>
+              </a:ext>
+            </a:extLst>
+          </p:cNvPr>
+          <p:cNvPicPr>
+            <a:picLocks noGrp="1" noChangeAspect="1" noChangeArrowheads="1"/>
+          </p:cNvPicPr>
+          <p:nvPr>
+            <p:ph idx="1"/>
+          </p:nvPr>
+        </p:nvPicPr>
+        <p:blipFill>
+          <a:blip r:embed="rId2">
+            <a:extLst>
+              <a:ext uri="{28A0092B-C50C-407E-A947-70E740481C1C}">
+                <a14:useLocalDpi xmlns:a14="http://schemas.microsoft.com/office/drawing/2010/main" val="0"/>
+              </a:ext>
+            </a:extLst>
+          </a:blip>
+          <a:srcRect/>
+          <a:stretch>
+            <a:fillRect/>
+          </a:stretch>
+        </p:blipFill>
+        <p:spPr bwMode="auto">
+          <a:xfrm>
+            <a:off x="836671" y="643466"/>
+            <a:ext cx="10518657" cy="5571067"/>
+          </a:xfrm>
+          <a:prstGeom prst="rect">
+            <a:avLst/>
+          </a:prstGeom>
+          <a:noFill/>
+          <a:extLst>
+            <a:ext uri="{909E8E84-426E-40DD-AFC4-6F175D3DCCD1}">
+              <a14:hiddenFill xmlns:a14="http://schemas.microsoft.com/office/drawing/2010/main">
+                <a:solidFill>
+                  <a:srgbClr val="FFFFFF"/>
+                </a:solidFill>
+              </a14:hiddenFill>
+            </a:ext>
+          </a:extLst>
+        </p:spPr>
+      </p:pic>
+      <p:sp>
+        <p:nvSpPr>
+          <p:cNvPr id="4" name="Footer Placeholder 3">
+            <a:extLst>
+              <a:ext uri="{FF2B5EF4-FFF2-40B4-BE49-F238E27FC236}">
+                <a16:creationId xmlns:a16="http://schemas.microsoft.com/office/drawing/2014/main" id="{844DAA07-2536-479A-859B-17688176C549}"/>
+              </a:ext>
+            </a:extLst>
+          </p:cNvPr>
+          <p:cNvSpPr>
+            <a:spLocks noGrp="1"/>
+          </p:cNvSpPr>
+          <p:nvPr>
+            <p:ph type="ftr" sz="quarter" idx="11"/>
+          </p:nvPr>
+        </p:nvSpPr>
+        <p:spPr>
+          <a:xfrm>
+            <a:off x="4038600" y="6356350"/>
+            <a:ext cx="4114800" cy="365125"/>
+          </a:xfrm>
+        </p:spPr>
+        <p:txBody>
+          <a:bodyPr vert="horz" lIns="91440" tIns="45720" rIns="91440" bIns="45720" rtlCol="0" anchor="ctr">
+            <a:normAutofit/>
+          </a:bodyPr>
+          <a:lstStyle/>
+          <a:p>
+            <a:pPr defTabSz="914400">
+              <a:spcAft>
+                <a:spcPts val="600"/>
+              </a:spcAft>
+            </a:pPr>
+            <a:r>
+              <a:rPr lang="en-US" kern="1200">
+                <a:solidFill>
+                  <a:schemeClr val="tx1">
+                    <a:tint val="75000"/>
+                  </a:schemeClr>
+                </a:solidFill>
+                <a:latin typeface="+mn-lt"/>
+                <a:ea typeface="+mn-ea"/>
+                <a:cs typeface="+mn-cs"/>
+              </a:rPr>
+              <a:t>Add a footer</a:t>
+            </a:r>
+          </a:p>
+        </p:txBody>
+      </p:sp>
+    </p:spTree>
+    <p:extLst>
+      <p:ext uri="{BB962C8B-B14F-4D97-AF65-F5344CB8AC3E}">
+        <p14:creationId xmlns:p14="http://schemas.microsoft.com/office/powerpoint/2010/main" val="1012076388"/>
+      </p:ext>
+    </p:extLst>
+  </p:cSld>
+  <p:clrMapOvr>
+    <a:masterClrMapping/>
+  </p:clrMapOvr>
+  <mc:AlternateContent xmlns:mc="http://schemas.openxmlformats.org/markup-compatibility/2006" xmlns:p14="http://schemas.microsoft.com/office/powerpoint/2010/main">
+    <mc:Choice Requires="p14">
+      <p:transition spd="med" p14:dur="700">
+        <p:fade/>
+      </p:transition>
+    </mc:Choice>
+    <mc:Fallback xmlns="">
+      <p:transition spd="med">
+        <p:fade/>
+      </p:transition>
+    </mc:Fallback>
+  </mc:AlternateContent>
+</p:sld>
+</file>
+
+<file path=ppt/slides/slide8.xml><?xml version="1.0" encoding="utf-8"?>
+<p:sld xmlns:a="http://schemas.openxmlformats.org/drawingml/2006/main" xmlns:r="http://schemas.openxmlformats.org/officeDocument/2006/relationships" xmlns:p="http://schemas.openxmlformats.org/presentationml/2006/main">
+  <p:cSld>
+    <p:bg>
+      <p:bgPr>
+        <a:solidFill>
+          <a:schemeClr val="bg1">
+            <a:tint val="95000"/>
+            <a:satMod val="170000"/>
+          </a:schemeClr>
+        </a:solidFill>
+        <a:effectLst/>
+      </p:bgPr>
+    </p:bg>
+    <p:spTree>
+      <p:nvGrpSpPr>
+        <p:cNvPr id="1" name=""/>
+        <p:cNvGrpSpPr/>
+        <p:nvPr/>
+      </p:nvGrpSpPr>
+      <p:grpSpPr>
+        <a:xfrm>
+          <a:off x="0" y="0"/>
+          <a:ext cx="0" cy="0"/>
+          <a:chOff x="0" y="0"/>
+          <a:chExt cx="0" cy="0"/>
+        </a:xfrm>
+      </p:grpSpPr>
+      <p:sp>
+        <p:nvSpPr>
+          <p:cNvPr id="2" name="Title 1">
+            <a:extLst>
+              <a:ext uri="{FF2B5EF4-FFF2-40B4-BE49-F238E27FC236}">
+                <a16:creationId xmlns:a16="http://schemas.microsoft.com/office/drawing/2014/main" id="{566A6327-5314-45CB-9F00-BC875423FB8B}"/>
+              </a:ext>
+            </a:extLst>
+          </p:cNvPr>
+          <p:cNvSpPr>
+            <a:spLocks noGrp="1"/>
+          </p:cNvSpPr>
+          <p:nvPr>
+            <p:ph type="title"/>
+          </p:nvPr>
+        </p:nvSpPr>
+        <p:spPr>
+          <a:xfrm>
+            <a:off x="6653600" y="1396289"/>
+            <a:ext cx="5006336" cy="1325563"/>
+          </a:xfrm>
+        </p:spPr>
+        <p:txBody>
+          <a:bodyPr>
+            <a:normAutofit/>
+          </a:bodyPr>
+          <a:lstStyle/>
+          <a:p>
+            <a:r>
+              <a:rPr lang="en-US" dirty="0"/>
+              <a:t>Drawing #5</a:t>
+            </a:r>
+          </a:p>
+        </p:txBody>
+      </p:sp>
+      <p:sp>
+        <p:nvSpPr>
+          <p:cNvPr id="18" name="Freeform: Shape 17">
+            <a:extLst>
+              <a:ext uri="{FF2B5EF4-FFF2-40B4-BE49-F238E27FC236}">
+                <a16:creationId xmlns:a16="http://schemas.microsoft.com/office/drawing/2014/main" id="{4F74D28C-3268-4E35-8EE1-D92CB4A85A7D}"/>
+              </a:ext>
+              <a:ext uri="{C183D7F6-B498-43B3-948B-1728B52AA6E4}">
+                <adec:decorative xmlns:adec="http://schemas.microsoft.com/office/drawing/2017/decorative" val="1"/>
+              </a:ext>
+            </a:extLst>
+          </p:cNvPr>
+          <p:cNvSpPr>
+            <a:spLocks noGrp="1" noRot="1" noChangeAspect="1" noMove="1" noResize="1" noEditPoints="1" noAdjustHandles="1" noChangeArrowheads="1" noChangeShapeType="1" noTextEdit="1"/>
+          </p:cNvSpPr>
+          <p:nvPr>
+            <p:extLst>
+              <p:ext uri="{386F3935-93C4-4BCD-93E2-E3B085C9AB24}">
+                <p16:designElem xmlns:p16="http://schemas.microsoft.com/office/powerpoint/2015/main" val="1"/>
+              </p:ext>
+            </p:extLst>
+          </p:nvPr>
+        </p:nvSpPr>
+        <p:spPr>
+          <a:xfrm flipH="1">
+            <a:off x="0" y="0"/>
+            <a:ext cx="6172782" cy="6858000"/>
+          </a:xfrm>
+          <a:custGeom>
+            <a:avLst/>
+            <a:gdLst>
+              <a:gd name="connsiteX0" fmla="*/ 6172782 w 6172782"/>
+              <a:gd name="connsiteY0" fmla="*/ 0 h 6858000"/>
+              <a:gd name="connsiteX1" fmla="*/ 69075 w 6172782"/>
+              <a:gd name="connsiteY1" fmla="*/ 0 h 6858000"/>
+              <a:gd name="connsiteX2" fmla="*/ 35131 w 6172782"/>
+              <a:gd name="connsiteY2" fmla="*/ 267128 h 6858000"/>
+              <a:gd name="connsiteX3" fmla="*/ 0 w 6172782"/>
+              <a:gd name="connsiteY3" fmla="*/ 962845 h 6858000"/>
+              <a:gd name="connsiteX4" fmla="*/ 3276103 w 6172782"/>
+              <a:gd name="connsiteY4" fmla="*/ 6782205 h 6858000"/>
+              <a:gd name="connsiteX5" fmla="*/ 3407923 w 6172782"/>
+              <a:gd name="connsiteY5" fmla="*/ 6858000 h 6858000"/>
+              <a:gd name="connsiteX6" fmla="*/ 6172782 w 6172782"/>
+              <a:gd name="connsiteY6" fmla="*/ 6858000 h 6858000"/>
+            </a:gdLst>
+            <a:ahLst/>
+            <a:cxnLst>
+              <a:cxn ang="0">
+                <a:pos x="connsiteX0" y="connsiteY0"/>
+              </a:cxn>
+              <a:cxn ang="0">
+                <a:pos x="connsiteX1" y="connsiteY1"/>
+              </a:cxn>
+              <a:cxn ang="0">
+                <a:pos x="connsiteX2" y="connsiteY2"/>
+              </a:cxn>
+              <a:cxn ang="0">
+                <a:pos x="connsiteX3" y="connsiteY3"/>
+              </a:cxn>
+              <a:cxn ang="0">
+                <a:pos x="connsiteX4" y="connsiteY4"/>
+              </a:cxn>
+              <a:cxn ang="0">
+                <a:pos x="connsiteX5" y="connsiteY5"/>
+              </a:cxn>
+              <a:cxn ang="0">
+                <a:pos x="connsiteX6" y="connsiteY6"/>
+              </a:cxn>
+            </a:cxnLst>
+            <a:rect l="l" t="t" r="r" b="b"/>
+            <a:pathLst>
+              <a:path w="6172782" h="6858000">
+                <a:moveTo>
+                  <a:pt x="6172782" y="0"/>
+                </a:moveTo>
+                <a:lnTo>
+                  <a:pt x="69075" y="0"/>
+                </a:lnTo>
+                <a:lnTo>
+                  <a:pt x="35131" y="267128"/>
+                </a:lnTo>
+                <a:cubicBezTo>
+                  <a:pt x="11901" y="495874"/>
+                  <a:pt x="0" y="727970"/>
+                  <a:pt x="0" y="962845"/>
+                </a:cubicBezTo>
+                <a:cubicBezTo>
+                  <a:pt x="0" y="3429034"/>
+                  <a:pt x="1312002" y="5588789"/>
+                  <a:pt x="3276103" y="6782205"/>
+                </a:cubicBezTo>
+                <a:lnTo>
+                  <a:pt x="3407923" y="6858000"/>
+                </a:lnTo>
+                <a:lnTo>
+                  <a:pt x="6172782" y="6858000"/>
+                </a:lnTo>
+                <a:close/>
+              </a:path>
+            </a:pathLst>
+          </a:custGeom>
+          <a:solidFill>
+            <a:srgbClr val="FFFFFF">
+              <a:alpha val="80000"/>
+            </a:srgbClr>
+          </a:solidFill>
+          <a:ln>
+            <a:noFill/>
+          </a:ln>
+        </p:spPr>
+        <p:style>
+          <a:lnRef idx="2">
+            <a:schemeClr val="accent1">
+              <a:shade val="50000"/>
+            </a:schemeClr>
+          </a:lnRef>
+          <a:fillRef idx="1">
+            <a:schemeClr val="accent1"/>
+          </a:fillRef>
+          <a:effectRef idx="0">
+            <a:schemeClr val="accent1"/>
+          </a:effectRef>
+          <a:fontRef idx="minor">
+            <a:schemeClr val="lt1"/>
+          </a:fontRef>
+        </p:style>
+        <p:txBody>
+          <a:bodyPr wrap="square" rtlCol="0" anchor="ctr">
+            <a:noAutofit/>
+          </a:bodyPr>
+          <a:lstStyle/>
+          <a:p>
+            <a:pPr marL="0" marR="0" lvl="0" indent="0" algn="ctr" defTabSz="914400" rtl="0" eaLnBrk="1" fontAlgn="auto" latinLnBrk="0" hangingPunct="1">
+              <a:lnSpc>
+                <a:spcPct val="100000"/>
+              </a:lnSpc>
+              <a:spcBef>
+                <a:spcPts val="0"/>
+              </a:spcBef>
+              <a:spcAft>
+                <a:spcPts val="0"/>
+              </a:spcAft>
+              <a:buClrTx/>
+              <a:buSzTx/>
+              <a:buFontTx/>
+              <a:buNone/>
+              <a:tabLst/>
+              <a:defRPr/>
+            </a:pPr>
+            <a:endParaRPr kumimoji="0" lang="en-US" sz="1800" b="0" i="0" u="none" strike="noStrike" kern="1200" cap="none" spc="0" normalizeH="0" baseline="0" noProof="0">
+              <a:ln>
+                <a:noFill/>
+              </a:ln>
+              <a:solidFill>
+                <a:prstClr val="white"/>
+              </a:solidFill>
+              <a:effectLst/>
+              <a:uLnTx/>
+              <a:uFillTx/>
+              <a:latin typeface="Calibri" panose="020F0502020204030204"/>
+              <a:ea typeface="+mn-ea"/>
+              <a:cs typeface="+mn-cs"/>
+            </a:endParaRPr>
+          </a:p>
+        </p:txBody>
+      </p:sp>
+      <p:sp>
+        <p:nvSpPr>
+          <p:cNvPr id="20" name="Freeform: Shape 19">
+            <a:extLst>
+              <a:ext uri="{FF2B5EF4-FFF2-40B4-BE49-F238E27FC236}">
+                <a16:creationId xmlns:a16="http://schemas.microsoft.com/office/drawing/2014/main" id="{58D44E42-C462-4105-BC86-FE75B4E3C4AF}"/>
+              </a:ext>
+              <a:ext uri="{C183D7F6-B498-43B3-948B-1728B52AA6E4}">
+                <adec:decorative xmlns:adec="http://schemas.microsoft.com/office/drawing/2017/decorative" val="1"/>
+              </a:ext>
+            </a:extLst>
+          </p:cNvPr>
+          <p:cNvSpPr>
+            <a:spLocks noGrp="1" noRot="1" noChangeAspect="1" noMove="1" noResize="1" noEditPoints="1" noAdjustHandles="1" noChangeArrowheads="1" noChangeShapeType="1" noTextEdit="1"/>
+          </p:cNvSpPr>
+          <p:nvPr>
+            <p:extLst>
+              <p:ext uri="{386F3935-93C4-4BCD-93E2-E3B085C9AB24}">
+                <p16:designElem xmlns:p16="http://schemas.microsoft.com/office/powerpoint/2015/main" val="1"/>
+              </p:ext>
+            </p:extLst>
+          </p:nvPr>
+        </p:nvSpPr>
+        <p:spPr>
+          <a:xfrm flipH="1">
+            <a:off x="0" y="0"/>
+            <a:ext cx="6024154" cy="6858000"/>
+          </a:xfrm>
+          <a:custGeom>
+            <a:avLst/>
+            <a:gdLst>
+              <a:gd name="connsiteX0" fmla="*/ 70374 w 6024154"/>
+              <a:gd name="connsiteY0" fmla="*/ 0 h 6858000"/>
+              <a:gd name="connsiteX1" fmla="*/ 6024154 w 6024154"/>
+              <a:gd name="connsiteY1" fmla="*/ 0 h 6858000"/>
+              <a:gd name="connsiteX2" fmla="*/ 6024154 w 6024154"/>
+              <a:gd name="connsiteY2" fmla="*/ 6858000 h 6858000"/>
+              <a:gd name="connsiteX3" fmla="*/ 3587167 w 6024154"/>
+              <a:gd name="connsiteY3" fmla="*/ 6858000 h 6858000"/>
+              <a:gd name="connsiteX4" fmla="*/ 3474220 w 6024154"/>
+              <a:gd name="connsiteY4" fmla="*/ 6800152 h 6858000"/>
+              <a:gd name="connsiteX5" fmla="*/ 0 w 6024154"/>
+              <a:gd name="connsiteY5" fmla="*/ 962844 h 6858000"/>
+              <a:gd name="connsiteX6" fmla="*/ 34274 w 6024154"/>
+              <a:gd name="connsiteY6" fmla="*/ 284091 h 6858000"/>
+            </a:gdLst>
+            <a:ahLst/>
+            <a:cxnLst>
+              <a:cxn ang="0">
+                <a:pos x="connsiteX0" y="connsiteY0"/>
+              </a:cxn>
+              <a:cxn ang="0">
+                <a:pos x="connsiteX1" y="connsiteY1"/>
+              </a:cxn>
+              <a:cxn ang="0">
+                <a:pos x="connsiteX2" y="connsiteY2"/>
+              </a:cxn>
+              <a:cxn ang="0">
+                <a:pos x="connsiteX3" y="connsiteY3"/>
+              </a:cxn>
+              <a:cxn ang="0">
+                <a:pos x="connsiteX4" y="connsiteY4"/>
+              </a:cxn>
+              <a:cxn ang="0">
+                <a:pos x="connsiteX5" y="connsiteY5"/>
+              </a:cxn>
+              <a:cxn ang="0">
+                <a:pos x="connsiteX6" y="connsiteY6"/>
+              </a:cxn>
+            </a:cxnLst>
+            <a:rect l="l" t="t" r="r" b="b"/>
+            <a:pathLst>
+              <a:path w="6024154" h="6858000">
+                <a:moveTo>
+                  <a:pt x="70374" y="0"/>
+                </a:moveTo>
+                <a:lnTo>
+                  <a:pt x="6024154" y="0"/>
+                </a:lnTo>
+                <a:lnTo>
+                  <a:pt x="6024154" y="6858000"/>
+                </a:lnTo>
+                <a:lnTo>
+                  <a:pt x="3587167" y="6858000"/>
+                </a:lnTo>
+                <a:lnTo>
+                  <a:pt x="3474220" y="6800152"/>
+                </a:lnTo>
+                <a:cubicBezTo>
+                  <a:pt x="1404818" y="5675986"/>
+                  <a:pt x="0" y="3483472"/>
+                  <a:pt x="0" y="962844"/>
+                </a:cubicBezTo>
+                <a:cubicBezTo>
+                  <a:pt x="0" y="733696"/>
+                  <a:pt x="11610" y="507260"/>
+                  <a:pt x="34274" y="284091"/>
+                </a:cubicBezTo>
+                <a:close/>
+              </a:path>
+            </a:pathLst>
+          </a:custGeom>
+          <a:solidFill>
+            <a:schemeClr val="tx1"/>
+          </a:solidFill>
+          <a:ln>
+            <a:noFill/>
+          </a:ln>
+        </p:spPr>
+        <p:style>
+          <a:lnRef idx="2">
+            <a:schemeClr val="accent1">
+              <a:shade val="50000"/>
+            </a:schemeClr>
+          </a:lnRef>
+          <a:fillRef idx="1">
+            <a:schemeClr val="accent1"/>
+          </a:fillRef>
+          <a:effectRef idx="0">
+            <a:schemeClr val="accent1"/>
+          </a:effectRef>
+          <a:fontRef idx="minor">
+            <a:schemeClr val="lt1"/>
+          </a:fontRef>
+        </p:style>
+        <p:txBody>
+          <a:bodyPr rtlCol="0" anchor="ctr"/>
+          <a:lstStyle/>
+          <a:p>
+            <a:pPr marL="0" marR="0" lvl="0" indent="0" algn="ctr" defTabSz="914400" rtl="0" eaLnBrk="1" fontAlgn="auto" latinLnBrk="0" hangingPunct="1">
+              <a:lnSpc>
+                <a:spcPct val="100000"/>
+              </a:lnSpc>
+              <a:spcBef>
+                <a:spcPts val="0"/>
+              </a:spcBef>
+              <a:spcAft>
+                <a:spcPts val="0"/>
+              </a:spcAft>
+              <a:buClrTx/>
+              <a:buSzTx/>
+              <a:buFontTx/>
+              <a:buNone/>
+              <a:tabLst/>
+              <a:defRPr/>
+            </a:pPr>
+            <a:endParaRPr kumimoji="0" lang="en-US" sz="1800" b="0" i="0" u="none" strike="noStrike" kern="1200" cap="none" spc="0" normalizeH="0" baseline="0" noProof="0">
+              <a:ln>
+                <a:noFill/>
+              </a:ln>
+              <a:solidFill>
+                <a:prstClr val="white"/>
+              </a:solidFill>
+              <a:effectLst/>
+              <a:uLnTx/>
+              <a:uFillTx/>
+              <a:latin typeface="Calibri" panose="020F0502020204030204"/>
+              <a:ea typeface="+mn-ea"/>
+              <a:cs typeface="+mn-cs"/>
+            </a:endParaRPr>
+          </a:p>
+        </p:txBody>
+      </p:sp>
+      <p:pic>
+        <p:nvPicPr>
+          <p:cNvPr id="8" name="Graphic 7" descr="Presentation with Checklist">
+            <a:extLst>
+              <a:ext uri="{FF2B5EF4-FFF2-40B4-BE49-F238E27FC236}">
+                <a16:creationId xmlns:a16="http://schemas.microsoft.com/office/drawing/2014/main" id="{77E2C276-8CC5-4881-84C7-C315A63D0505}"/>
+              </a:ext>
+            </a:extLst>
+          </p:cNvPr>
+          <p:cNvPicPr>
+            <a:picLocks noChangeAspect="1"/>
+          </p:cNvPicPr>
+          <p:nvPr/>
+        </p:nvPicPr>
+        <p:blipFill>
+          <a:blip r:embed="rId2">
+            <a:extLst>
+              <a:ext uri="{28A0092B-C50C-407E-A947-70E740481C1C}">
+                <a14:useLocalDpi xmlns:a14="http://schemas.microsoft.com/office/drawing/2010/main" val="0"/>
+              </a:ext>
+              <a:ext uri="{96DAC541-7B7A-43D3-8B79-37D633B846F1}">
+                <asvg:svgBlip xmlns:asvg="http://schemas.microsoft.com/office/drawing/2016/SVG/main" r:embed="rId3"/>
+              </a:ext>
+            </a:extLst>
+          </a:blip>
+          <a:stretch>
+            <a:fillRect/>
+          </a:stretch>
+        </p:blipFill>
+        <p:spPr>
+          <a:xfrm>
+            <a:off x="364241" y="643466"/>
+            <a:ext cx="4105275" cy="4105275"/>
+          </a:xfrm>
+          <a:prstGeom prst="rect">
+            <a:avLst/>
+          </a:prstGeom>
+        </p:spPr>
+      </p:pic>
+      <p:sp>
+        <p:nvSpPr>
+          <p:cNvPr id="3" name="Content Placeholder 2">
+            <a:extLst>
+              <a:ext uri="{FF2B5EF4-FFF2-40B4-BE49-F238E27FC236}">
+                <a16:creationId xmlns:a16="http://schemas.microsoft.com/office/drawing/2014/main" id="{243F4135-D972-4007-ADC9-8172C07FD54E}"/>
+              </a:ext>
+            </a:extLst>
+          </p:cNvPr>
+          <p:cNvSpPr>
+            <a:spLocks noGrp="1"/>
+          </p:cNvSpPr>
+          <p:nvPr>
+            <p:ph idx="1"/>
+          </p:nvPr>
+        </p:nvSpPr>
+        <p:spPr>
+          <a:xfrm>
+            <a:off x="6658044" y="2871982"/>
+            <a:ext cx="5006336" cy="3181684"/>
+          </a:xfrm>
+        </p:spPr>
+        <p:txBody>
+          <a:bodyPr anchor="t">
+            <a:normAutofit/>
+          </a:bodyPr>
+          <a:lstStyle/>
+          <a:p>
+            <a:r>
               <a:rPr lang="en-US" sz="1800"/>
               <a:t>Using the lettering guide to create your title blocks</a:t>
             </a:r>
@@ -6335,6 +7762,105 @@
   </p:cSld>
   <p:clrMapOvr>
     <a:overrideClrMapping bg1="dk1" tx1="lt1" bg2="dk2" tx2="lt2" accent1="accent1" accent2="accent2" accent3="accent3" accent4="accent4" accent5="accent5" accent6="accent6" hlink="hlink" folHlink="folHlink"/>
+  </p:clrMapOvr>
+  <mc:AlternateContent xmlns:mc="http://schemas.openxmlformats.org/markup-compatibility/2006" xmlns:p14="http://schemas.microsoft.com/office/powerpoint/2010/main">
+    <mc:Choice Requires="p14">
+      <p:transition spd="med" p14:dur="700">
+        <p:fade/>
+      </p:transition>
+    </mc:Choice>
+    <mc:Fallback xmlns="">
+      <p:transition spd="med">
+        <p:fade/>
+      </p:transition>
+    </mc:Fallback>
+  </mc:AlternateContent>
+</p:sld>
+</file>
+
+<file path=ppt/slides/slide9.xml><?xml version="1.0" encoding="utf-8"?>
+<p:sld xmlns:a="http://schemas.openxmlformats.org/drawingml/2006/main" xmlns:r="http://schemas.openxmlformats.org/officeDocument/2006/relationships" xmlns:p="http://schemas.openxmlformats.org/presentationml/2006/main">
+  <p:cSld>
+    <p:spTree>
+      <p:nvGrpSpPr>
+        <p:cNvPr id="1" name=""/>
+        <p:cNvGrpSpPr/>
+        <p:nvPr/>
+      </p:nvGrpSpPr>
+      <p:grpSpPr>
+        <a:xfrm>
+          <a:off x="0" y="0"/>
+          <a:ext cx="0" cy="0"/>
+          <a:chOff x="0" y="0"/>
+          <a:chExt cx="0" cy="0"/>
+        </a:xfrm>
+      </p:grpSpPr>
+      <p:sp>
+        <p:nvSpPr>
+          <p:cNvPr id="2" name="Title 1">
+            <a:extLst>
+              <a:ext uri="{FF2B5EF4-FFF2-40B4-BE49-F238E27FC236}">
+                <a16:creationId xmlns:a16="http://schemas.microsoft.com/office/drawing/2014/main" id="{5FFFF665-DBFE-4139-ACF5-B7D92BBE8CD9}"/>
+              </a:ext>
+            </a:extLst>
+          </p:cNvPr>
+          <p:cNvSpPr>
+            <a:spLocks noGrp="1"/>
+          </p:cNvSpPr>
+          <p:nvPr>
+            <p:ph type="title"/>
+          </p:nvPr>
+        </p:nvSpPr>
+        <p:spPr/>
+        <p:txBody>
+          <a:bodyPr/>
+          <a:lstStyle/>
+          <a:p>
+            <a:r>
+              <a:rPr lang="en-US" dirty="0"/>
+              <a:t>Lesson Plan 4</a:t>
+            </a:r>
+          </a:p>
+        </p:txBody>
+      </p:sp>
+      <p:sp>
+        <p:nvSpPr>
+          <p:cNvPr id="4" name="Footer Placeholder 3">
+            <a:extLst>
+              <a:ext uri="{FF2B5EF4-FFF2-40B4-BE49-F238E27FC236}">
+                <a16:creationId xmlns:a16="http://schemas.microsoft.com/office/drawing/2014/main" id="{D0F8768D-96E5-431F-BE40-E106E81AE634}"/>
+              </a:ext>
+            </a:extLst>
+          </p:cNvPr>
+          <p:cNvSpPr>
+            <a:spLocks noGrp="1"/>
+          </p:cNvSpPr>
+          <p:nvPr>
+            <p:ph type="ftr" sz="quarter" idx="11"/>
+          </p:nvPr>
+        </p:nvSpPr>
+        <p:spPr/>
+        <p:txBody>
+          <a:bodyPr/>
+          <a:lstStyle/>
+          <a:p>
+            <a:r>
+              <a:rPr lang="en-US"/>
+              <a:t>Add a footer</a:t>
+            </a:r>
+            <a:endParaRPr lang="en-US" dirty="0"/>
+          </a:p>
+        </p:txBody>
+      </p:sp>
+    </p:spTree>
+    <p:extLst>
+      <p:ext uri="{BB962C8B-B14F-4D97-AF65-F5344CB8AC3E}">
+        <p14:creationId xmlns:p14="http://schemas.microsoft.com/office/powerpoint/2010/main" val="1823108940"/>
+      </p:ext>
+    </p:extLst>
+  </p:cSld>
+  <p:clrMapOvr>
+    <a:masterClrMapping/>
   </p:clrMapOvr>
   <mc:AlternateContent xmlns:mc="http://schemas.openxmlformats.org/markup-compatibility/2006" xmlns:p14="http://schemas.microsoft.com/office/powerpoint/2010/main">
     <mc:Choice Requires="p14">

</xml_diff>